<commit_message>
Update Information about RDP to report_v2.doc
</commit_message>
<xml_diff>
--- a/report_picture.pptx
+++ b/report_picture.pptx
@@ -5,15 +5,17 @@
     <p:sldMasterId id="2147483648" r:id="rId1"/>
   </p:sldMasterIdLst>
   <p:notesMasterIdLst>
-    <p:notesMasterId r:id="rId5"/>
+    <p:notesMasterId r:id="rId7"/>
   </p:notesMasterIdLst>
   <p:handoutMasterIdLst>
-    <p:handoutMasterId r:id="rId6"/>
+    <p:handoutMasterId r:id="rId8"/>
   </p:handoutMasterIdLst>
   <p:sldIdLst>
     <p:sldId id="422" r:id="rId2"/>
-    <p:sldId id="424" r:id="rId3"/>
-    <p:sldId id="423" r:id="rId4"/>
+    <p:sldId id="426" r:id="rId3"/>
+    <p:sldId id="424" r:id="rId4"/>
+    <p:sldId id="423" r:id="rId5"/>
+    <p:sldId id="425" r:id="rId6"/>
   </p:sldIdLst>
   <p:sldSz cx="9793288" cy="6408738"/>
   <p:notesSz cx="6735763" cy="9866313"/>
@@ -3734,287 +3736,6 @@
           <a:chExt cx="0" cy="0"/>
         </a:xfrm>
       </p:grpSpPr>
-      <p:sp>
-        <p:nvSpPr>
-          <p:cNvPr id="2" name="직사각형 1">
-            <a:extLst>
-              <a:ext uri="{FF2B5EF4-FFF2-40B4-BE49-F238E27FC236}">
-                <a16:creationId xmlns:a16="http://schemas.microsoft.com/office/drawing/2014/main" id="{61CC2BA9-7CF2-4AD0-AE46-F7040E7DD854}"/>
-              </a:ext>
-            </a:extLst>
-          </p:cNvPr>
-          <p:cNvSpPr/>
-          <p:nvPr/>
-        </p:nvSpPr>
-        <p:spPr>
-          <a:xfrm>
-            <a:off x="1800300" y="2340273"/>
-            <a:ext cx="2952328" cy="2088232"/>
-          </a:xfrm>
-          <a:prstGeom prst="rect">
-            <a:avLst/>
-          </a:prstGeom>
-          <a:noFill/>
-          <a:ln>
-            <a:solidFill>
-              <a:schemeClr val="tx1"/>
-            </a:solidFill>
-          </a:ln>
-        </p:spPr>
-        <p:style>
-          <a:lnRef idx="2">
-            <a:schemeClr val="accent1">
-              <a:shade val="50000"/>
-            </a:schemeClr>
-          </a:lnRef>
-          <a:fillRef idx="1">
-            <a:schemeClr val="accent1"/>
-          </a:fillRef>
-          <a:effectRef idx="0">
-            <a:schemeClr val="accent1"/>
-          </a:effectRef>
-          <a:fontRef idx="minor">
-            <a:schemeClr val="lt1"/>
-          </a:fontRef>
-        </p:style>
-        <p:txBody>
-          <a:bodyPr rtlCol="0" anchor="ctr"/>
-          <a:lstStyle/>
-          <a:p>
-            <a:pPr algn="ctr"/>
-            <a:endParaRPr lang="ko-KR" altLang="en-US"/>
-          </a:p>
-        </p:txBody>
-      </p:sp>
-      <p:sp>
-        <p:nvSpPr>
-          <p:cNvPr id="7" name="직사각형 6">
-            <a:extLst>
-              <a:ext uri="{FF2B5EF4-FFF2-40B4-BE49-F238E27FC236}">
-                <a16:creationId xmlns:a16="http://schemas.microsoft.com/office/drawing/2014/main" id="{11A01CDD-469A-472A-80E4-B5AB9923735B}"/>
-              </a:ext>
-            </a:extLst>
-          </p:cNvPr>
-          <p:cNvSpPr/>
-          <p:nvPr/>
-        </p:nvSpPr>
-        <p:spPr>
-          <a:xfrm>
-            <a:off x="6696844" y="2340273"/>
-            <a:ext cx="2952328" cy="2088232"/>
-          </a:xfrm>
-          <a:prstGeom prst="rect">
-            <a:avLst/>
-          </a:prstGeom>
-          <a:noFill/>
-          <a:ln>
-            <a:solidFill>
-              <a:schemeClr val="tx1"/>
-            </a:solidFill>
-          </a:ln>
-        </p:spPr>
-        <p:style>
-          <a:lnRef idx="2">
-            <a:schemeClr val="accent1">
-              <a:shade val="50000"/>
-            </a:schemeClr>
-          </a:lnRef>
-          <a:fillRef idx="1">
-            <a:schemeClr val="accent1"/>
-          </a:fillRef>
-          <a:effectRef idx="0">
-            <a:schemeClr val="accent1"/>
-          </a:effectRef>
-          <a:fontRef idx="minor">
-            <a:schemeClr val="lt1"/>
-          </a:fontRef>
-        </p:style>
-        <p:txBody>
-          <a:bodyPr rtlCol="0" anchor="ctr"/>
-          <a:lstStyle/>
-          <a:p>
-            <a:pPr algn="ctr"/>
-            <a:endParaRPr lang="ko-KR" altLang="en-US"/>
-          </a:p>
-        </p:txBody>
-      </p:sp>
-      <p:sp>
-        <p:nvSpPr>
-          <p:cNvPr id="9" name="직사각형 8">
-            <a:extLst>
-              <a:ext uri="{FF2B5EF4-FFF2-40B4-BE49-F238E27FC236}">
-                <a16:creationId xmlns:a16="http://schemas.microsoft.com/office/drawing/2014/main" id="{515E5298-7BAB-4688-977F-BC34E7E06B26}"/>
-              </a:ext>
-            </a:extLst>
-          </p:cNvPr>
-          <p:cNvSpPr/>
-          <p:nvPr/>
-        </p:nvSpPr>
-        <p:spPr>
-          <a:xfrm>
-            <a:off x="3024436" y="3276377"/>
-            <a:ext cx="1512168" cy="855712"/>
-          </a:xfrm>
-          <a:prstGeom prst="rect">
-            <a:avLst/>
-          </a:prstGeom>
-          <a:solidFill>
-            <a:schemeClr val="accent6">
-              <a:lumMod val="60000"/>
-              <a:lumOff val="40000"/>
-            </a:schemeClr>
-          </a:solidFill>
-          <a:ln>
-            <a:solidFill>
-              <a:schemeClr val="tx1"/>
-            </a:solidFill>
-          </a:ln>
-        </p:spPr>
-        <p:style>
-          <a:lnRef idx="2">
-            <a:schemeClr val="accent1">
-              <a:shade val="50000"/>
-            </a:schemeClr>
-          </a:lnRef>
-          <a:fillRef idx="1">
-            <a:schemeClr val="accent1"/>
-          </a:fillRef>
-          <a:effectRef idx="0">
-            <a:schemeClr val="accent1"/>
-          </a:effectRef>
-          <a:fontRef idx="minor">
-            <a:schemeClr val="lt1"/>
-          </a:fontRef>
-        </p:style>
-        <p:txBody>
-          <a:bodyPr rtlCol="0" anchor="ctr"/>
-          <a:lstStyle/>
-          <a:p>
-            <a:pPr algn="ctr"/>
-            <a:r>
-              <a:rPr lang="en-US" altLang="ko-KR" dirty="0">
-                <a:solidFill>
-                  <a:schemeClr val="tx1"/>
-                </a:solidFill>
-              </a:rPr>
-              <a:t>VNC Server</a:t>
-            </a:r>
-            <a:endParaRPr lang="ko-KR" altLang="en-US" dirty="0">
-              <a:solidFill>
-                <a:schemeClr val="tx1"/>
-              </a:solidFill>
-            </a:endParaRPr>
-          </a:p>
-        </p:txBody>
-      </p:sp>
-      <p:sp>
-        <p:nvSpPr>
-          <p:cNvPr id="10" name="직사각형 9">
-            <a:extLst>
-              <a:ext uri="{FF2B5EF4-FFF2-40B4-BE49-F238E27FC236}">
-                <a16:creationId xmlns:a16="http://schemas.microsoft.com/office/drawing/2014/main" id="{D9F958ED-CA55-4DD1-B43B-6AE5377892EB}"/>
-              </a:ext>
-            </a:extLst>
-          </p:cNvPr>
-          <p:cNvSpPr/>
-          <p:nvPr/>
-        </p:nvSpPr>
-        <p:spPr>
-          <a:xfrm>
-            <a:off x="6912868" y="3276377"/>
-            <a:ext cx="1512168" cy="855712"/>
-          </a:xfrm>
-          <a:prstGeom prst="rect">
-            <a:avLst/>
-          </a:prstGeom>
-          <a:solidFill>
-            <a:schemeClr val="accent6">
-              <a:lumMod val="60000"/>
-              <a:lumOff val="40000"/>
-            </a:schemeClr>
-          </a:solidFill>
-          <a:ln>
-            <a:solidFill>
-              <a:schemeClr val="tx1"/>
-            </a:solidFill>
-          </a:ln>
-        </p:spPr>
-        <p:style>
-          <a:lnRef idx="2">
-            <a:schemeClr val="accent1">
-              <a:shade val="50000"/>
-            </a:schemeClr>
-          </a:lnRef>
-          <a:fillRef idx="1">
-            <a:schemeClr val="accent1"/>
-          </a:fillRef>
-          <a:effectRef idx="0">
-            <a:schemeClr val="accent1"/>
-          </a:effectRef>
-          <a:fontRef idx="minor">
-            <a:schemeClr val="lt1"/>
-          </a:fontRef>
-        </p:style>
-        <p:txBody>
-          <a:bodyPr rtlCol="0" anchor="ctr"/>
-          <a:lstStyle/>
-          <a:p>
-            <a:pPr algn="ctr"/>
-            <a:r>
-              <a:rPr lang="en-US" altLang="ko-KR" dirty="0">
-                <a:solidFill>
-                  <a:schemeClr val="tx1"/>
-                </a:solidFill>
-              </a:rPr>
-              <a:t>VNC Client</a:t>
-            </a:r>
-            <a:endParaRPr lang="ko-KR" altLang="en-US" dirty="0">
-              <a:solidFill>
-                <a:schemeClr val="tx1"/>
-              </a:solidFill>
-            </a:endParaRPr>
-          </a:p>
-        </p:txBody>
-      </p:sp>
-      <p:pic>
-        <p:nvPicPr>
-          <p:cNvPr id="4" name="그래픽 3" descr="모니터">
-            <a:extLst>
-              <a:ext uri="{FF2B5EF4-FFF2-40B4-BE49-F238E27FC236}">
-                <a16:creationId xmlns:a16="http://schemas.microsoft.com/office/drawing/2014/main" id="{1D691AB1-8BCA-48C3-8E2A-E6DF7E9787D2}"/>
-              </a:ext>
-            </a:extLst>
-          </p:cNvPr>
-          <p:cNvPicPr>
-            <a:picLocks noChangeAspect="1"/>
-          </p:cNvPicPr>
-          <p:nvPr/>
-        </p:nvPicPr>
-        <p:blipFill>
-          <a:blip r:embed="rId2">
-            <a:extLst>
-              <a:ext uri="{28A0092B-C50C-407E-A947-70E740481C1C}">
-                <a14:useLocalDpi xmlns:a14="http://schemas.microsoft.com/office/drawing/2010/main" val="0"/>
-              </a:ext>
-              <a:ext uri="{96DAC541-7B7A-43D3-8B79-37D633B846F1}">
-                <asvg:svgBlip xmlns:asvg="http://schemas.microsoft.com/office/drawing/2016/SVG/main" r:embed="rId3"/>
-              </a:ext>
-            </a:extLst>
-          </a:blip>
-          <a:stretch>
-            <a:fillRect/>
-          </a:stretch>
-        </p:blipFill>
-        <p:spPr>
-          <a:xfrm>
-            <a:off x="7236904" y="1044129"/>
-            <a:ext cx="1872208" cy="1872208"/>
-          </a:xfrm>
-          <a:prstGeom prst="rect">
-            <a:avLst/>
-          </a:prstGeom>
-        </p:spPr>
-      </p:pic>
       <p:pic>
         <p:nvPicPr>
           <p:cNvPr id="21" name="그림 20" descr="음식이(가) 표시된 사진&#10;&#10;자동 생성된 설명">
@@ -4030,7 +3751,7 @@
           <p:nvPr/>
         </p:nvPicPr>
         <p:blipFill>
-          <a:blip r:embed="rId4">
+          <a:blip r:embed="rId2">
             <a:extLst>
               <a:ext uri="{28A0092B-C50C-407E-A947-70E740481C1C}">
                 <a14:useLocalDpi xmlns:a14="http://schemas.microsoft.com/office/drawing/2010/main" val="0"/>
@@ -4051,389 +3772,699 @@
           </a:prstGeom>
         </p:spPr>
       </p:pic>
-      <p:pic>
-        <p:nvPicPr>
-          <p:cNvPr id="23" name="그림 22" descr="디스플레이, 건물, 창문이(가) 표시된 사진&#10;&#10;자동 생성된 설명">
+      <p:grpSp>
+        <p:nvGrpSpPr>
+          <p:cNvPr id="3" name="그룹 2">
             <a:extLst>
               <a:ext uri="{FF2B5EF4-FFF2-40B4-BE49-F238E27FC236}">
-                <a16:creationId xmlns:a16="http://schemas.microsoft.com/office/drawing/2014/main" id="{C864EDEC-7649-486E-907B-84C2EACFDCA3}"/>
+                <a16:creationId xmlns:a16="http://schemas.microsoft.com/office/drawing/2014/main" id="{14BCC73A-3E4C-40F2-8DEF-443FCDD738A6}"/>
               </a:ext>
             </a:extLst>
           </p:cNvPr>
-          <p:cNvPicPr>
-            <a:picLocks noChangeAspect="1"/>
-          </p:cNvPicPr>
+          <p:cNvGrpSpPr/>
           <p:nvPr/>
-        </p:nvPicPr>
-        <p:blipFill>
-          <a:blip r:embed="rId5" cstate="print">
-            <a:extLst>
-              <a:ext uri="{28A0092B-C50C-407E-A947-70E740481C1C}">
-                <a14:useLocalDpi xmlns:a14="http://schemas.microsoft.com/office/drawing/2010/main" val="0"/>
-              </a:ext>
-            </a:extLst>
-          </a:blip>
-          <a:stretch>
-            <a:fillRect/>
-          </a:stretch>
-        </p:blipFill>
-        <p:spPr>
+        </p:nvGrpSpPr>
+        <p:grpSpPr>
           <a:xfrm>
-            <a:off x="4062348" y="1138558"/>
-            <a:ext cx="898622" cy="985691"/>
+            <a:off x="1800300" y="1044129"/>
+            <a:ext cx="7848872" cy="3384376"/>
+            <a:chOff x="1800300" y="1044129"/>
+            <a:chExt cx="7848872" cy="3384376"/>
           </a:xfrm>
-          <a:prstGeom prst="rect">
-            <a:avLst/>
-          </a:prstGeom>
-        </p:spPr>
-      </p:pic>
-      <p:pic>
-        <p:nvPicPr>
-          <p:cNvPr id="27" name="그림 26" descr="그리기이(가) 표시된 사진&#10;&#10;자동 생성된 설명">
-            <a:extLst>
-              <a:ext uri="{FF2B5EF4-FFF2-40B4-BE49-F238E27FC236}">
-                <a16:creationId xmlns:a16="http://schemas.microsoft.com/office/drawing/2014/main" id="{BD8B7F12-6ED7-41D8-8642-15186C874A14}"/>
-              </a:ext>
-            </a:extLst>
-          </p:cNvPr>
-          <p:cNvPicPr>
-            <a:picLocks noChangeAspect="1"/>
-          </p:cNvPicPr>
-          <p:nvPr/>
-        </p:nvPicPr>
-        <p:blipFill>
-          <a:blip r:embed="rId6" cstate="print">
-            <a:extLst>
-              <a:ext uri="{28A0092B-C50C-407E-A947-70E740481C1C}">
-                <a14:useLocalDpi xmlns:a14="http://schemas.microsoft.com/office/drawing/2010/main" val="0"/>
-              </a:ext>
-            </a:extLst>
-          </a:blip>
-          <a:stretch>
-            <a:fillRect/>
-          </a:stretch>
-        </p:blipFill>
-        <p:spPr>
-          <a:xfrm>
-            <a:off x="1980320" y="1132755"/>
-            <a:ext cx="689282" cy="847478"/>
-          </a:xfrm>
-          <a:prstGeom prst="rect">
-            <a:avLst/>
-          </a:prstGeom>
-        </p:spPr>
-      </p:pic>
-      <p:cxnSp>
-        <p:nvCxnSpPr>
-          <p:cNvPr id="29" name="직선 화살표 연결선 28">
-            <a:extLst>
-              <a:ext uri="{FF2B5EF4-FFF2-40B4-BE49-F238E27FC236}">
-                <a16:creationId xmlns:a16="http://schemas.microsoft.com/office/drawing/2014/main" id="{070C5DFF-8183-4EA9-98B6-74581210CFFD}"/>
-              </a:ext>
-            </a:extLst>
-          </p:cNvPr>
-          <p:cNvCxnSpPr>
-            <a:cxnSpLocks/>
-          </p:cNvCxnSpPr>
-          <p:nvPr/>
-        </p:nvCxnSpPr>
-        <p:spPr>
-          <a:xfrm>
-            <a:off x="3240460" y="2523199"/>
-            <a:ext cx="0" cy="684076"/>
-          </a:xfrm>
-          <a:prstGeom prst="straightConnector1">
-            <a:avLst/>
-          </a:prstGeom>
-          <a:ln w="38100">
-            <a:tailEnd type="triangle"/>
-          </a:ln>
-        </p:spPr>
-        <p:style>
-          <a:lnRef idx="1">
-            <a:schemeClr val="accent1"/>
-          </a:lnRef>
-          <a:fillRef idx="0">
-            <a:schemeClr val="accent1"/>
-          </a:fillRef>
-          <a:effectRef idx="0">
-            <a:schemeClr val="accent1"/>
-          </a:effectRef>
-          <a:fontRef idx="minor">
-            <a:schemeClr val="tx1"/>
-          </a:fontRef>
-        </p:style>
-      </p:cxnSp>
-      <p:sp>
-        <p:nvSpPr>
-          <p:cNvPr id="30" name="직사각형 29">
-            <a:extLst>
-              <a:ext uri="{FF2B5EF4-FFF2-40B4-BE49-F238E27FC236}">
-                <a16:creationId xmlns:a16="http://schemas.microsoft.com/office/drawing/2014/main" id="{C49FA582-7B9B-4B77-A320-AF41700CC13A}"/>
-              </a:ext>
-            </a:extLst>
-          </p:cNvPr>
-          <p:cNvSpPr/>
-          <p:nvPr/>
-        </p:nvSpPr>
-        <p:spPr>
-          <a:xfrm>
-            <a:off x="3240460" y="2700313"/>
-            <a:ext cx="1428746" cy="432048"/>
-          </a:xfrm>
-          <a:prstGeom prst="rect">
-            <a:avLst/>
-          </a:prstGeom>
-          <a:noFill/>
-          <a:ln>
-            <a:noFill/>
-          </a:ln>
-        </p:spPr>
-        <p:style>
-          <a:lnRef idx="2">
-            <a:schemeClr val="accent1">
-              <a:shade val="50000"/>
-            </a:schemeClr>
-          </a:lnRef>
-          <a:fillRef idx="1">
-            <a:schemeClr val="accent1"/>
-          </a:fillRef>
-          <a:effectRef idx="0">
-            <a:schemeClr val="accent1"/>
-          </a:effectRef>
-          <a:fontRef idx="minor">
-            <a:schemeClr val="lt1"/>
-          </a:fontRef>
-        </p:style>
-        <p:txBody>
-          <a:bodyPr rtlCol="0" anchor="ctr"/>
-          <a:lstStyle/>
-          <a:p>
-            <a:pPr algn="ctr"/>
-            <a:r>
-              <a:rPr lang="en-US" altLang="ko-KR" sz="1050" dirty="0">
+        </p:grpSpPr>
+        <p:sp>
+          <p:nvSpPr>
+            <p:cNvPr id="2" name="직사각형 1">
+              <a:extLst>
+                <a:ext uri="{FF2B5EF4-FFF2-40B4-BE49-F238E27FC236}">
+                  <a16:creationId xmlns:a16="http://schemas.microsoft.com/office/drawing/2014/main" id="{61CC2BA9-7CF2-4AD0-AE46-F7040E7DD854}"/>
+                </a:ext>
+              </a:extLst>
+            </p:cNvPr>
+            <p:cNvSpPr/>
+            <p:nvPr/>
+          </p:nvSpPr>
+          <p:spPr>
+            <a:xfrm>
+              <a:off x="1800300" y="2340273"/>
+              <a:ext cx="2952328" cy="2088232"/>
+            </a:xfrm>
+            <a:prstGeom prst="rect">
+              <a:avLst/>
+            </a:prstGeom>
+            <a:solidFill>
+              <a:schemeClr val="tx1">
+                <a:lumMod val="50000"/>
+                <a:lumOff val="50000"/>
+              </a:schemeClr>
+            </a:solidFill>
+            <a:ln>
+              <a:solidFill>
+                <a:schemeClr val="tx1"/>
+              </a:solidFill>
+            </a:ln>
+          </p:spPr>
+          <p:style>
+            <a:lnRef idx="2">
+              <a:schemeClr val="accent1">
+                <a:shade val="50000"/>
+              </a:schemeClr>
+            </a:lnRef>
+            <a:fillRef idx="1">
+              <a:schemeClr val="accent1"/>
+            </a:fillRef>
+            <a:effectRef idx="0">
+              <a:schemeClr val="accent1"/>
+            </a:effectRef>
+            <a:fontRef idx="minor">
+              <a:schemeClr val="lt1"/>
+            </a:fontRef>
+          </p:style>
+          <p:txBody>
+            <a:bodyPr rtlCol="0" anchor="ctr"/>
+            <a:lstStyle/>
+            <a:p>
+              <a:pPr algn="ctr"/>
+              <a:endParaRPr lang="ko-KR" altLang="en-US"/>
+            </a:p>
+          </p:txBody>
+        </p:sp>
+        <p:sp>
+          <p:nvSpPr>
+            <p:cNvPr id="7" name="직사각형 6">
+              <a:extLst>
+                <a:ext uri="{FF2B5EF4-FFF2-40B4-BE49-F238E27FC236}">
+                  <a16:creationId xmlns:a16="http://schemas.microsoft.com/office/drawing/2014/main" id="{11A01CDD-469A-472A-80E4-B5AB9923735B}"/>
+                </a:ext>
+              </a:extLst>
+            </p:cNvPr>
+            <p:cNvSpPr/>
+            <p:nvPr/>
+          </p:nvSpPr>
+          <p:spPr>
+            <a:xfrm>
+              <a:off x="6696844" y="2340273"/>
+              <a:ext cx="2952328" cy="2088232"/>
+            </a:xfrm>
+            <a:prstGeom prst="rect">
+              <a:avLst/>
+            </a:prstGeom>
+            <a:solidFill>
+              <a:schemeClr val="tx1">
+                <a:lumMod val="50000"/>
+                <a:lumOff val="50000"/>
+              </a:schemeClr>
+            </a:solidFill>
+            <a:ln>
+              <a:solidFill>
+                <a:schemeClr val="tx1"/>
+              </a:solidFill>
+            </a:ln>
+          </p:spPr>
+          <p:style>
+            <a:lnRef idx="2">
+              <a:schemeClr val="accent1">
+                <a:shade val="50000"/>
+              </a:schemeClr>
+            </a:lnRef>
+            <a:fillRef idx="1">
+              <a:schemeClr val="accent1"/>
+            </a:fillRef>
+            <a:effectRef idx="0">
+              <a:schemeClr val="accent1"/>
+            </a:effectRef>
+            <a:fontRef idx="minor">
+              <a:schemeClr val="lt1"/>
+            </a:fontRef>
+          </p:style>
+          <p:txBody>
+            <a:bodyPr rtlCol="0" anchor="ctr"/>
+            <a:lstStyle/>
+            <a:p>
+              <a:pPr algn="ctr"/>
+              <a:endParaRPr lang="ko-KR" altLang="en-US"/>
+            </a:p>
+          </p:txBody>
+        </p:sp>
+        <p:sp>
+          <p:nvSpPr>
+            <p:cNvPr id="9" name="직사각형 8">
+              <a:extLst>
+                <a:ext uri="{FF2B5EF4-FFF2-40B4-BE49-F238E27FC236}">
+                  <a16:creationId xmlns:a16="http://schemas.microsoft.com/office/drawing/2014/main" id="{515E5298-7BAB-4688-977F-BC34E7E06B26}"/>
+                </a:ext>
+              </a:extLst>
+            </p:cNvPr>
+            <p:cNvSpPr/>
+            <p:nvPr/>
+          </p:nvSpPr>
+          <p:spPr>
+            <a:xfrm>
+              <a:off x="3024436" y="3276377"/>
+              <a:ext cx="1512168" cy="855712"/>
+            </a:xfrm>
+            <a:prstGeom prst="rect">
+              <a:avLst/>
+            </a:prstGeom>
+            <a:solidFill>
+              <a:schemeClr val="bg1">
+                <a:lumMod val="75000"/>
+              </a:schemeClr>
+            </a:solidFill>
+            <a:ln>
+              <a:solidFill>
+                <a:schemeClr val="tx1"/>
+              </a:solidFill>
+            </a:ln>
+          </p:spPr>
+          <p:style>
+            <a:lnRef idx="2">
+              <a:schemeClr val="accent1">
+                <a:shade val="50000"/>
+              </a:schemeClr>
+            </a:lnRef>
+            <a:fillRef idx="1">
+              <a:schemeClr val="accent1"/>
+            </a:fillRef>
+            <a:effectRef idx="0">
+              <a:schemeClr val="accent1"/>
+            </a:effectRef>
+            <a:fontRef idx="minor">
+              <a:schemeClr val="lt1"/>
+            </a:fontRef>
+          </p:style>
+          <p:txBody>
+            <a:bodyPr rtlCol="0" anchor="ctr"/>
+            <a:lstStyle/>
+            <a:p>
+              <a:pPr algn="ctr"/>
+              <a:r>
+                <a:rPr lang="en-US" altLang="ko-KR" dirty="0">
+                  <a:solidFill>
+                    <a:schemeClr val="tx1"/>
+                  </a:solidFill>
+                </a:rPr>
+                <a:t>VNC Server</a:t>
+              </a:r>
+              <a:endParaRPr lang="ko-KR" altLang="en-US" dirty="0">
                 <a:solidFill>
                   <a:schemeClr val="tx1"/>
                 </a:solidFill>
-              </a:rPr>
-              <a:t>1. Send graphic data to VNC Server</a:t>
-            </a:r>
-            <a:endParaRPr lang="ko-KR" altLang="en-US" sz="1050" dirty="0">
+              </a:endParaRPr>
+            </a:p>
+          </p:txBody>
+        </p:sp>
+        <p:sp>
+          <p:nvSpPr>
+            <p:cNvPr id="10" name="직사각형 9">
+              <a:extLst>
+                <a:ext uri="{FF2B5EF4-FFF2-40B4-BE49-F238E27FC236}">
+                  <a16:creationId xmlns:a16="http://schemas.microsoft.com/office/drawing/2014/main" id="{D9F958ED-CA55-4DD1-B43B-6AE5377892EB}"/>
+                </a:ext>
+              </a:extLst>
+            </p:cNvPr>
+            <p:cNvSpPr/>
+            <p:nvPr/>
+          </p:nvSpPr>
+          <p:spPr>
+            <a:xfrm>
+              <a:off x="6912868" y="3276377"/>
+              <a:ext cx="1512168" cy="855712"/>
+            </a:xfrm>
+            <a:prstGeom prst="rect">
+              <a:avLst/>
+            </a:prstGeom>
+            <a:solidFill>
+              <a:schemeClr val="bg1">
+                <a:lumMod val="75000"/>
+              </a:schemeClr>
+            </a:solidFill>
+            <a:ln>
               <a:solidFill>
                 <a:schemeClr val="tx1"/>
               </a:solidFill>
-            </a:endParaRPr>
-          </a:p>
-        </p:txBody>
-      </p:sp>
-      <p:cxnSp>
-        <p:nvCxnSpPr>
-          <p:cNvPr id="32" name="직선 화살표 연결선 31">
-            <a:extLst>
-              <a:ext uri="{FF2B5EF4-FFF2-40B4-BE49-F238E27FC236}">
-                <a16:creationId xmlns:a16="http://schemas.microsoft.com/office/drawing/2014/main" id="{C4392BE6-E891-4CD1-9F15-3E1079C7B87B}"/>
-              </a:ext>
-            </a:extLst>
-          </p:cNvPr>
-          <p:cNvCxnSpPr>
-            <a:cxnSpLocks/>
-            <a:stCxn id="9" idx="3"/>
-            <a:endCxn id="10" idx="1"/>
-          </p:cNvCxnSpPr>
-          <p:nvPr/>
-        </p:nvCxnSpPr>
-        <p:spPr>
-          <a:xfrm>
-            <a:off x="4536604" y="3704233"/>
-            <a:ext cx="2376264" cy="0"/>
-          </a:xfrm>
-          <a:prstGeom prst="straightConnector1">
-            <a:avLst/>
-          </a:prstGeom>
-          <a:ln w="38100">
-            <a:tailEnd type="triangle"/>
-          </a:ln>
-        </p:spPr>
-        <p:style>
-          <a:lnRef idx="1">
-            <a:schemeClr val="accent1"/>
-          </a:lnRef>
-          <a:fillRef idx="0">
-            <a:schemeClr val="accent1"/>
-          </a:fillRef>
-          <a:effectRef idx="0">
-            <a:schemeClr val="accent1"/>
-          </a:effectRef>
-          <a:fontRef idx="minor">
-            <a:schemeClr val="tx1"/>
-          </a:fontRef>
-        </p:style>
-      </p:cxnSp>
-      <p:cxnSp>
-        <p:nvCxnSpPr>
-          <p:cNvPr id="36" name="직선 화살표 연결선 35">
-            <a:extLst>
-              <a:ext uri="{FF2B5EF4-FFF2-40B4-BE49-F238E27FC236}">
-                <a16:creationId xmlns:a16="http://schemas.microsoft.com/office/drawing/2014/main" id="{5AF37990-DDB2-40A9-819A-692CA350F0F3}"/>
-              </a:ext>
-            </a:extLst>
-          </p:cNvPr>
-          <p:cNvCxnSpPr>
-            <a:cxnSpLocks/>
-          </p:cNvCxnSpPr>
-          <p:nvPr/>
-        </p:nvCxnSpPr>
-        <p:spPr>
-          <a:xfrm flipV="1">
-            <a:off x="8137004" y="2586038"/>
-            <a:ext cx="0" cy="690339"/>
-          </a:xfrm>
-          <a:prstGeom prst="straightConnector1">
-            <a:avLst/>
-          </a:prstGeom>
-          <a:ln w="38100">
-            <a:tailEnd type="triangle"/>
-          </a:ln>
-        </p:spPr>
-        <p:style>
-          <a:lnRef idx="1">
-            <a:schemeClr val="accent1"/>
-          </a:lnRef>
-          <a:fillRef idx="0">
-            <a:schemeClr val="accent1"/>
-          </a:fillRef>
-          <a:effectRef idx="0">
-            <a:schemeClr val="accent1"/>
-          </a:effectRef>
-          <a:fontRef idx="minor">
-            <a:schemeClr val="tx1"/>
-          </a:fontRef>
-        </p:style>
-      </p:cxnSp>
-      <p:sp>
-        <p:nvSpPr>
-          <p:cNvPr id="40" name="직사각형 39">
-            <a:extLst>
-              <a:ext uri="{FF2B5EF4-FFF2-40B4-BE49-F238E27FC236}">
-                <a16:creationId xmlns:a16="http://schemas.microsoft.com/office/drawing/2014/main" id="{C987D05E-576C-403F-BED1-C6EB9C7E99A5}"/>
-              </a:ext>
-            </a:extLst>
-          </p:cNvPr>
-          <p:cNvSpPr/>
-          <p:nvPr/>
-        </p:nvSpPr>
-        <p:spPr>
-          <a:xfrm>
-            <a:off x="8148418" y="2772321"/>
-            <a:ext cx="1428746" cy="432048"/>
-          </a:xfrm>
-          <a:prstGeom prst="rect">
-            <a:avLst/>
-          </a:prstGeom>
-          <a:noFill/>
-          <a:ln>
-            <a:noFill/>
-          </a:ln>
-        </p:spPr>
-        <p:style>
-          <a:lnRef idx="2">
-            <a:schemeClr val="accent1">
-              <a:shade val="50000"/>
-            </a:schemeClr>
-          </a:lnRef>
-          <a:fillRef idx="1">
-            <a:schemeClr val="accent1"/>
-          </a:fillRef>
-          <a:effectRef idx="0">
-            <a:schemeClr val="accent1"/>
-          </a:effectRef>
-          <a:fontRef idx="minor">
-            <a:schemeClr val="lt1"/>
-          </a:fontRef>
-        </p:style>
-        <p:txBody>
-          <a:bodyPr rtlCol="0" anchor="ctr"/>
-          <a:lstStyle/>
-          <a:p>
-            <a:pPr algn="ctr"/>
-            <a:r>
-              <a:rPr lang="en-US" altLang="ko-KR" sz="1050" dirty="0">
+            </a:ln>
+          </p:spPr>
+          <p:style>
+            <a:lnRef idx="2">
+              <a:schemeClr val="accent1">
+                <a:shade val="50000"/>
+              </a:schemeClr>
+            </a:lnRef>
+            <a:fillRef idx="1">
+              <a:schemeClr val="accent1"/>
+            </a:fillRef>
+            <a:effectRef idx="0">
+              <a:schemeClr val="accent1"/>
+            </a:effectRef>
+            <a:fontRef idx="minor">
+              <a:schemeClr val="lt1"/>
+            </a:fontRef>
+          </p:style>
+          <p:txBody>
+            <a:bodyPr rtlCol="0" anchor="ctr"/>
+            <a:lstStyle/>
+            <a:p>
+              <a:pPr algn="ctr"/>
+              <a:r>
+                <a:rPr lang="en-US" altLang="ko-KR" dirty="0">
+                  <a:solidFill>
+                    <a:schemeClr val="tx1"/>
+                  </a:solidFill>
+                </a:rPr>
+                <a:t>VNC Client</a:t>
+              </a:r>
+              <a:endParaRPr lang="ko-KR" altLang="en-US" dirty="0">
                 <a:solidFill>
                   <a:schemeClr val="tx1"/>
                 </a:solidFill>
-              </a:rPr>
-              <a:t>3. Transform frame buffer and display</a:t>
-            </a:r>
-            <a:endParaRPr lang="ko-KR" altLang="en-US" sz="1050" dirty="0">
-              <a:solidFill>
-                <a:schemeClr val="tx1"/>
-              </a:solidFill>
-            </a:endParaRPr>
-          </a:p>
-        </p:txBody>
-      </p:sp>
-      <p:sp>
-        <p:nvSpPr>
-          <p:cNvPr id="41" name="직사각형 40">
-            <a:extLst>
-              <a:ext uri="{FF2B5EF4-FFF2-40B4-BE49-F238E27FC236}">
-                <a16:creationId xmlns:a16="http://schemas.microsoft.com/office/drawing/2014/main" id="{DC789F07-FA94-4645-B62C-6F09553188BA}"/>
-              </a:ext>
-            </a:extLst>
-          </p:cNvPr>
-          <p:cNvSpPr/>
-          <p:nvPr/>
-        </p:nvSpPr>
-        <p:spPr>
-          <a:xfrm>
-            <a:off x="4608612" y="3277674"/>
-            <a:ext cx="2232248" cy="358743"/>
-          </a:xfrm>
-          <a:prstGeom prst="rect">
-            <a:avLst/>
-          </a:prstGeom>
-          <a:noFill/>
-          <a:ln>
+              </a:endParaRPr>
+            </a:p>
+          </p:txBody>
+        </p:sp>
+        <p:pic>
+          <p:nvPicPr>
+            <p:cNvPr id="4" name="그래픽 3" descr="모니터">
+              <a:extLst>
+                <a:ext uri="{FF2B5EF4-FFF2-40B4-BE49-F238E27FC236}">
+                  <a16:creationId xmlns:a16="http://schemas.microsoft.com/office/drawing/2014/main" id="{1D691AB1-8BCA-48C3-8E2A-E6DF7E9787D2}"/>
+                </a:ext>
+              </a:extLst>
+            </p:cNvPr>
+            <p:cNvPicPr>
+              <a:picLocks noChangeAspect="1"/>
+            </p:cNvPicPr>
+            <p:nvPr/>
+          </p:nvPicPr>
+          <p:blipFill>
+            <a:blip r:embed="rId3">
+              <a:extLst>
+                <a:ext uri="{28A0092B-C50C-407E-A947-70E740481C1C}">
+                  <a14:useLocalDpi xmlns:a14="http://schemas.microsoft.com/office/drawing/2010/main" val="0"/>
+                </a:ext>
+                <a:ext uri="{96DAC541-7B7A-43D3-8B79-37D633B846F1}">
+                  <asvg:svgBlip xmlns:asvg="http://schemas.microsoft.com/office/drawing/2016/SVG/main" r:embed="rId4"/>
+                </a:ext>
+              </a:extLst>
+            </a:blip>
+            <a:stretch>
+              <a:fillRect/>
+            </a:stretch>
+          </p:blipFill>
+          <p:spPr>
+            <a:xfrm>
+              <a:off x="7236904" y="1044129"/>
+              <a:ext cx="1872208" cy="1872208"/>
+            </a:xfrm>
+            <a:prstGeom prst="rect">
+              <a:avLst/>
+            </a:prstGeom>
+          </p:spPr>
+        </p:pic>
+        <p:pic>
+          <p:nvPicPr>
+            <p:cNvPr id="23" name="그림 22" descr="디스플레이, 건물, 창문이(가) 표시된 사진&#10;&#10;자동 생성된 설명">
+              <a:extLst>
+                <a:ext uri="{FF2B5EF4-FFF2-40B4-BE49-F238E27FC236}">
+                  <a16:creationId xmlns:a16="http://schemas.microsoft.com/office/drawing/2014/main" id="{C864EDEC-7649-486E-907B-84C2EACFDCA3}"/>
+                </a:ext>
+              </a:extLst>
+            </p:cNvPr>
+            <p:cNvPicPr>
+              <a:picLocks noChangeAspect="1"/>
+            </p:cNvPicPr>
+            <p:nvPr/>
+          </p:nvPicPr>
+          <p:blipFill>
+            <a:blip r:embed="rId5" cstate="print">
+              <a:extLst>
+                <a:ext uri="{28A0092B-C50C-407E-A947-70E740481C1C}">
+                  <a14:useLocalDpi xmlns:a14="http://schemas.microsoft.com/office/drawing/2010/main" val="0"/>
+                </a:ext>
+              </a:extLst>
+            </a:blip>
+            <a:stretch>
+              <a:fillRect/>
+            </a:stretch>
+          </p:blipFill>
+          <p:spPr>
+            <a:xfrm>
+              <a:off x="4062348" y="1138558"/>
+              <a:ext cx="898622" cy="985691"/>
+            </a:xfrm>
+            <a:prstGeom prst="rect">
+              <a:avLst/>
+            </a:prstGeom>
+          </p:spPr>
+        </p:pic>
+        <p:pic>
+          <p:nvPicPr>
+            <p:cNvPr id="27" name="그림 26" descr="그리기이(가) 표시된 사진&#10;&#10;자동 생성된 설명">
+              <a:extLst>
+                <a:ext uri="{FF2B5EF4-FFF2-40B4-BE49-F238E27FC236}">
+                  <a16:creationId xmlns:a16="http://schemas.microsoft.com/office/drawing/2014/main" id="{BD8B7F12-6ED7-41D8-8642-15186C874A14}"/>
+                </a:ext>
+              </a:extLst>
+            </p:cNvPr>
+            <p:cNvPicPr>
+              <a:picLocks noChangeAspect="1"/>
+            </p:cNvPicPr>
+            <p:nvPr/>
+          </p:nvPicPr>
+          <p:blipFill>
+            <a:blip r:embed="rId6" cstate="print">
+              <a:extLst>
+                <a:ext uri="{28A0092B-C50C-407E-A947-70E740481C1C}">
+                  <a14:useLocalDpi xmlns:a14="http://schemas.microsoft.com/office/drawing/2010/main" val="0"/>
+                </a:ext>
+              </a:extLst>
+            </a:blip>
+            <a:stretch>
+              <a:fillRect/>
+            </a:stretch>
+          </p:blipFill>
+          <p:spPr>
+            <a:xfrm>
+              <a:off x="1980320" y="1132755"/>
+              <a:ext cx="689282" cy="847478"/>
+            </a:xfrm>
+            <a:prstGeom prst="rect">
+              <a:avLst/>
+            </a:prstGeom>
+          </p:spPr>
+        </p:pic>
+        <p:cxnSp>
+          <p:nvCxnSpPr>
+            <p:cNvPr id="29" name="직선 화살표 연결선 28">
+              <a:extLst>
+                <a:ext uri="{FF2B5EF4-FFF2-40B4-BE49-F238E27FC236}">
+                  <a16:creationId xmlns:a16="http://schemas.microsoft.com/office/drawing/2014/main" id="{070C5DFF-8183-4EA9-98B6-74581210CFFD}"/>
+                </a:ext>
+              </a:extLst>
+            </p:cNvPr>
+            <p:cNvCxnSpPr>
+              <a:cxnSpLocks/>
+            </p:cNvCxnSpPr>
+            <p:nvPr/>
+          </p:nvCxnSpPr>
+          <p:spPr>
+            <a:xfrm>
+              <a:off x="3240460" y="2523199"/>
+              <a:ext cx="0" cy="684076"/>
+            </a:xfrm>
+            <a:prstGeom prst="straightConnector1">
+              <a:avLst/>
+            </a:prstGeom>
+            <a:ln w="38100">
+              <a:tailEnd type="triangle"/>
+            </a:ln>
+          </p:spPr>
+          <p:style>
+            <a:lnRef idx="1">
+              <a:schemeClr val="accent1"/>
+            </a:lnRef>
+            <a:fillRef idx="0">
+              <a:schemeClr val="accent1"/>
+            </a:fillRef>
+            <a:effectRef idx="0">
+              <a:schemeClr val="accent1"/>
+            </a:effectRef>
+            <a:fontRef idx="minor">
+              <a:schemeClr val="tx1"/>
+            </a:fontRef>
+          </p:style>
+        </p:cxnSp>
+        <p:sp>
+          <p:nvSpPr>
+            <p:cNvPr id="30" name="직사각형 29">
+              <a:extLst>
+                <a:ext uri="{FF2B5EF4-FFF2-40B4-BE49-F238E27FC236}">
+                  <a16:creationId xmlns:a16="http://schemas.microsoft.com/office/drawing/2014/main" id="{C49FA582-7B9B-4B77-A320-AF41700CC13A}"/>
+                </a:ext>
+              </a:extLst>
+            </p:cNvPr>
+            <p:cNvSpPr/>
+            <p:nvPr/>
+          </p:nvSpPr>
+          <p:spPr>
+            <a:xfrm>
+              <a:off x="3240460" y="2700313"/>
+              <a:ext cx="1428746" cy="432048"/>
+            </a:xfrm>
+            <a:prstGeom prst="rect">
+              <a:avLst/>
+            </a:prstGeom>
             <a:noFill/>
-          </a:ln>
-        </p:spPr>
-        <p:style>
-          <a:lnRef idx="2">
-            <a:schemeClr val="accent1">
-              <a:shade val="50000"/>
-            </a:schemeClr>
-          </a:lnRef>
-          <a:fillRef idx="1">
-            <a:schemeClr val="accent1"/>
-          </a:fillRef>
-          <a:effectRef idx="0">
-            <a:schemeClr val="accent1"/>
-          </a:effectRef>
-          <a:fontRef idx="minor">
-            <a:schemeClr val="lt1"/>
-          </a:fontRef>
-        </p:style>
-        <p:txBody>
-          <a:bodyPr rtlCol="0" anchor="ctr"/>
-          <a:lstStyle/>
-          <a:p>
-            <a:pPr algn="ctr"/>
-            <a:r>
-              <a:rPr lang="en-US" altLang="ko-KR" sz="1050" dirty="0">
+            <a:ln>
+              <a:noFill/>
+            </a:ln>
+          </p:spPr>
+          <p:style>
+            <a:lnRef idx="2">
+              <a:schemeClr val="accent1">
+                <a:shade val="50000"/>
+              </a:schemeClr>
+            </a:lnRef>
+            <a:fillRef idx="1">
+              <a:schemeClr val="accent1"/>
+            </a:fillRef>
+            <a:effectRef idx="0">
+              <a:schemeClr val="accent1"/>
+            </a:effectRef>
+            <a:fontRef idx="minor">
+              <a:schemeClr val="lt1"/>
+            </a:fontRef>
+          </p:style>
+          <p:txBody>
+            <a:bodyPr rtlCol="0" anchor="ctr"/>
+            <a:lstStyle/>
+            <a:p>
+              <a:pPr algn="ctr"/>
+              <a:r>
+                <a:rPr lang="en-US" altLang="ko-KR" sz="1050" dirty="0">
+                  <a:solidFill>
+                    <a:schemeClr val="tx1"/>
+                  </a:solidFill>
+                </a:rPr>
+                <a:t>1. Send graphic data to VNC Server</a:t>
+              </a:r>
+              <a:endParaRPr lang="ko-KR" altLang="en-US" sz="1050" dirty="0">
                 <a:solidFill>
                   <a:schemeClr val="tx1"/>
                 </a:solidFill>
-              </a:rPr>
-              <a:t>2. Convert graphic data to RBF and send them to clients.</a:t>
-            </a:r>
-            <a:endParaRPr lang="ko-KR" altLang="en-US" sz="1050" dirty="0">
-              <a:solidFill>
-                <a:schemeClr val="tx1"/>
-              </a:solidFill>
-            </a:endParaRPr>
-          </a:p>
-        </p:txBody>
-      </p:sp>
+              </a:endParaRPr>
+            </a:p>
+          </p:txBody>
+        </p:sp>
+        <p:cxnSp>
+          <p:nvCxnSpPr>
+            <p:cNvPr id="32" name="직선 화살표 연결선 31">
+              <a:extLst>
+                <a:ext uri="{FF2B5EF4-FFF2-40B4-BE49-F238E27FC236}">
+                  <a16:creationId xmlns:a16="http://schemas.microsoft.com/office/drawing/2014/main" id="{C4392BE6-E891-4CD1-9F15-3E1079C7B87B}"/>
+                </a:ext>
+              </a:extLst>
+            </p:cNvPr>
+            <p:cNvCxnSpPr>
+              <a:cxnSpLocks/>
+              <a:stCxn id="9" idx="3"/>
+              <a:endCxn id="10" idx="1"/>
+            </p:cNvCxnSpPr>
+            <p:nvPr/>
+          </p:nvCxnSpPr>
+          <p:spPr>
+            <a:xfrm>
+              <a:off x="4536604" y="3704233"/>
+              <a:ext cx="2376264" cy="0"/>
+            </a:xfrm>
+            <a:prstGeom prst="straightConnector1">
+              <a:avLst/>
+            </a:prstGeom>
+            <a:ln w="38100">
+              <a:tailEnd type="triangle"/>
+            </a:ln>
+          </p:spPr>
+          <p:style>
+            <a:lnRef idx="1">
+              <a:schemeClr val="accent1"/>
+            </a:lnRef>
+            <a:fillRef idx="0">
+              <a:schemeClr val="accent1"/>
+            </a:fillRef>
+            <a:effectRef idx="0">
+              <a:schemeClr val="accent1"/>
+            </a:effectRef>
+            <a:fontRef idx="minor">
+              <a:schemeClr val="tx1"/>
+            </a:fontRef>
+          </p:style>
+        </p:cxnSp>
+        <p:cxnSp>
+          <p:nvCxnSpPr>
+            <p:cNvPr id="36" name="직선 화살표 연결선 35">
+              <a:extLst>
+                <a:ext uri="{FF2B5EF4-FFF2-40B4-BE49-F238E27FC236}">
+                  <a16:creationId xmlns:a16="http://schemas.microsoft.com/office/drawing/2014/main" id="{5AF37990-DDB2-40A9-819A-692CA350F0F3}"/>
+                </a:ext>
+              </a:extLst>
+            </p:cNvPr>
+            <p:cNvCxnSpPr>
+              <a:cxnSpLocks/>
+            </p:cNvCxnSpPr>
+            <p:nvPr/>
+          </p:nvCxnSpPr>
+          <p:spPr>
+            <a:xfrm flipV="1">
+              <a:off x="8137004" y="2586038"/>
+              <a:ext cx="0" cy="690339"/>
+            </a:xfrm>
+            <a:prstGeom prst="straightConnector1">
+              <a:avLst/>
+            </a:prstGeom>
+            <a:ln w="38100">
+              <a:tailEnd type="triangle"/>
+            </a:ln>
+          </p:spPr>
+          <p:style>
+            <a:lnRef idx="1">
+              <a:schemeClr val="accent1"/>
+            </a:lnRef>
+            <a:fillRef idx="0">
+              <a:schemeClr val="accent1"/>
+            </a:fillRef>
+            <a:effectRef idx="0">
+              <a:schemeClr val="accent1"/>
+            </a:effectRef>
+            <a:fontRef idx="minor">
+              <a:schemeClr val="tx1"/>
+            </a:fontRef>
+          </p:style>
+        </p:cxnSp>
+        <p:sp>
+          <p:nvSpPr>
+            <p:cNvPr id="40" name="직사각형 39">
+              <a:extLst>
+                <a:ext uri="{FF2B5EF4-FFF2-40B4-BE49-F238E27FC236}">
+                  <a16:creationId xmlns:a16="http://schemas.microsoft.com/office/drawing/2014/main" id="{C987D05E-576C-403F-BED1-C6EB9C7E99A5}"/>
+                </a:ext>
+              </a:extLst>
+            </p:cNvPr>
+            <p:cNvSpPr/>
+            <p:nvPr/>
+          </p:nvSpPr>
+          <p:spPr>
+            <a:xfrm>
+              <a:off x="8148418" y="2772321"/>
+              <a:ext cx="1428746" cy="432048"/>
+            </a:xfrm>
+            <a:prstGeom prst="rect">
+              <a:avLst/>
+            </a:prstGeom>
+            <a:noFill/>
+            <a:ln>
+              <a:noFill/>
+            </a:ln>
+          </p:spPr>
+          <p:style>
+            <a:lnRef idx="2">
+              <a:schemeClr val="accent1">
+                <a:shade val="50000"/>
+              </a:schemeClr>
+            </a:lnRef>
+            <a:fillRef idx="1">
+              <a:schemeClr val="accent1"/>
+            </a:fillRef>
+            <a:effectRef idx="0">
+              <a:schemeClr val="accent1"/>
+            </a:effectRef>
+            <a:fontRef idx="minor">
+              <a:schemeClr val="lt1"/>
+            </a:fontRef>
+          </p:style>
+          <p:txBody>
+            <a:bodyPr rtlCol="0" anchor="ctr"/>
+            <a:lstStyle/>
+            <a:p>
+              <a:pPr algn="ctr"/>
+              <a:r>
+                <a:rPr lang="en-US" altLang="ko-KR" sz="1050" dirty="0">
+                  <a:solidFill>
+                    <a:schemeClr val="tx1"/>
+                  </a:solidFill>
+                </a:rPr>
+                <a:t>3. Transform frame buffer and display</a:t>
+              </a:r>
+              <a:endParaRPr lang="ko-KR" altLang="en-US" sz="1050" dirty="0">
+                <a:solidFill>
+                  <a:schemeClr val="tx1"/>
+                </a:solidFill>
+              </a:endParaRPr>
+            </a:p>
+          </p:txBody>
+        </p:sp>
+        <p:sp>
+          <p:nvSpPr>
+            <p:cNvPr id="41" name="직사각형 40">
+              <a:extLst>
+                <a:ext uri="{FF2B5EF4-FFF2-40B4-BE49-F238E27FC236}">
+                  <a16:creationId xmlns:a16="http://schemas.microsoft.com/office/drawing/2014/main" id="{DC789F07-FA94-4645-B62C-6F09553188BA}"/>
+                </a:ext>
+              </a:extLst>
+            </p:cNvPr>
+            <p:cNvSpPr/>
+            <p:nvPr/>
+          </p:nvSpPr>
+          <p:spPr>
+            <a:xfrm>
+              <a:off x="4608612" y="3277674"/>
+              <a:ext cx="2232248" cy="358743"/>
+            </a:xfrm>
+            <a:prstGeom prst="rect">
+              <a:avLst/>
+            </a:prstGeom>
+            <a:noFill/>
+            <a:ln>
+              <a:noFill/>
+            </a:ln>
+          </p:spPr>
+          <p:style>
+            <a:lnRef idx="2">
+              <a:schemeClr val="accent1">
+                <a:shade val="50000"/>
+              </a:schemeClr>
+            </a:lnRef>
+            <a:fillRef idx="1">
+              <a:schemeClr val="accent1"/>
+            </a:fillRef>
+            <a:effectRef idx="0">
+              <a:schemeClr val="accent1"/>
+            </a:effectRef>
+            <a:fontRef idx="minor">
+              <a:schemeClr val="lt1"/>
+            </a:fontRef>
+          </p:style>
+          <p:txBody>
+            <a:bodyPr rtlCol="0" anchor="ctr"/>
+            <a:lstStyle/>
+            <a:p>
+              <a:pPr algn="ctr"/>
+              <a:r>
+                <a:rPr lang="en-US" altLang="ko-KR" sz="1050" dirty="0">
+                  <a:solidFill>
+                    <a:schemeClr val="tx1"/>
+                  </a:solidFill>
+                </a:rPr>
+                <a:t>2. Convert graphic data to RBF and send them to clients.</a:t>
+              </a:r>
+              <a:endParaRPr lang="ko-KR" altLang="en-US" sz="1050" dirty="0">
+                <a:solidFill>
+                  <a:schemeClr val="tx1"/>
+                </a:solidFill>
+              </a:endParaRPr>
+            </a:p>
+          </p:txBody>
+        </p:sp>
+      </p:grpSp>
     </p:spTree>
     <p:extLst>
       <p:ext uri="{BB962C8B-B14F-4D97-AF65-F5344CB8AC3E}">
@@ -4451,6 +4482,768 @@
 </file>
 
 <file path=ppt/slides/slide2.xml><?xml version="1.0" encoding="utf-8"?>
+<p:sld xmlns:a="http://schemas.openxmlformats.org/drawingml/2006/main" xmlns:r="http://schemas.openxmlformats.org/officeDocument/2006/relationships" xmlns:p="http://schemas.openxmlformats.org/presentationml/2006/main">
+  <p:cSld>
+    <p:spTree>
+      <p:nvGrpSpPr>
+        <p:cNvPr id="1" name=""/>
+        <p:cNvGrpSpPr/>
+        <p:nvPr/>
+      </p:nvGrpSpPr>
+      <p:grpSpPr>
+        <a:xfrm>
+          <a:off x="0" y="0"/>
+          <a:ext cx="0" cy="0"/>
+          <a:chOff x="0" y="0"/>
+          <a:chExt cx="0" cy="0"/>
+        </a:xfrm>
+      </p:grpSpPr>
+      <p:grpSp>
+        <p:nvGrpSpPr>
+          <p:cNvPr id="3" name="그룹 2">
+            <a:extLst>
+              <a:ext uri="{FF2B5EF4-FFF2-40B4-BE49-F238E27FC236}">
+                <a16:creationId xmlns:a16="http://schemas.microsoft.com/office/drawing/2014/main" id="{14BCC73A-3E4C-40F2-8DEF-443FCDD738A6}"/>
+              </a:ext>
+            </a:extLst>
+          </p:cNvPr>
+          <p:cNvGrpSpPr/>
+          <p:nvPr/>
+        </p:nvGrpSpPr>
+        <p:grpSpPr>
+          <a:xfrm>
+            <a:off x="1800300" y="1044129"/>
+            <a:ext cx="7848872" cy="3384376"/>
+            <a:chOff x="1800300" y="1044129"/>
+            <a:chExt cx="7848872" cy="3384376"/>
+          </a:xfrm>
+        </p:grpSpPr>
+        <p:sp>
+          <p:nvSpPr>
+            <p:cNvPr id="2" name="직사각형 1">
+              <a:extLst>
+                <a:ext uri="{FF2B5EF4-FFF2-40B4-BE49-F238E27FC236}">
+                  <a16:creationId xmlns:a16="http://schemas.microsoft.com/office/drawing/2014/main" id="{61CC2BA9-7CF2-4AD0-AE46-F7040E7DD854}"/>
+                </a:ext>
+              </a:extLst>
+            </p:cNvPr>
+            <p:cNvSpPr/>
+            <p:nvPr/>
+          </p:nvSpPr>
+          <p:spPr>
+            <a:xfrm>
+              <a:off x="1800300" y="2340273"/>
+              <a:ext cx="2952328" cy="2088232"/>
+            </a:xfrm>
+            <a:prstGeom prst="rect">
+              <a:avLst/>
+            </a:prstGeom>
+            <a:solidFill>
+              <a:schemeClr val="tx1">
+                <a:lumMod val="50000"/>
+                <a:lumOff val="50000"/>
+              </a:schemeClr>
+            </a:solidFill>
+            <a:ln>
+              <a:solidFill>
+                <a:schemeClr val="tx1"/>
+              </a:solidFill>
+            </a:ln>
+          </p:spPr>
+          <p:style>
+            <a:lnRef idx="2">
+              <a:schemeClr val="accent1">
+                <a:shade val="50000"/>
+              </a:schemeClr>
+            </a:lnRef>
+            <a:fillRef idx="1">
+              <a:schemeClr val="accent1"/>
+            </a:fillRef>
+            <a:effectRef idx="0">
+              <a:schemeClr val="accent1"/>
+            </a:effectRef>
+            <a:fontRef idx="minor">
+              <a:schemeClr val="lt1"/>
+            </a:fontRef>
+          </p:style>
+          <p:txBody>
+            <a:bodyPr rtlCol="0" anchor="ctr"/>
+            <a:lstStyle/>
+            <a:p>
+              <a:pPr algn="ctr"/>
+              <a:endParaRPr lang="ko-KR" altLang="en-US"/>
+            </a:p>
+          </p:txBody>
+        </p:sp>
+        <p:sp>
+          <p:nvSpPr>
+            <p:cNvPr id="7" name="직사각형 6">
+              <a:extLst>
+                <a:ext uri="{FF2B5EF4-FFF2-40B4-BE49-F238E27FC236}">
+                  <a16:creationId xmlns:a16="http://schemas.microsoft.com/office/drawing/2014/main" id="{11A01CDD-469A-472A-80E4-B5AB9923735B}"/>
+                </a:ext>
+              </a:extLst>
+            </p:cNvPr>
+            <p:cNvSpPr/>
+            <p:nvPr/>
+          </p:nvSpPr>
+          <p:spPr>
+            <a:xfrm>
+              <a:off x="6696844" y="2340273"/>
+              <a:ext cx="2952328" cy="2088232"/>
+            </a:xfrm>
+            <a:prstGeom prst="rect">
+              <a:avLst/>
+            </a:prstGeom>
+            <a:solidFill>
+              <a:schemeClr val="tx1">
+                <a:lumMod val="50000"/>
+                <a:lumOff val="50000"/>
+              </a:schemeClr>
+            </a:solidFill>
+            <a:ln>
+              <a:solidFill>
+                <a:schemeClr val="tx1"/>
+              </a:solidFill>
+            </a:ln>
+          </p:spPr>
+          <p:style>
+            <a:lnRef idx="2">
+              <a:schemeClr val="accent1">
+                <a:shade val="50000"/>
+              </a:schemeClr>
+            </a:lnRef>
+            <a:fillRef idx="1">
+              <a:schemeClr val="accent1"/>
+            </a:fillRef>
+            <a:effectRef idx="0">
+              <a:schemeClr val="accent1"/>
+            </a:effectRef>
+            <a:fontRef idx="minor">
+              <a:schemeClr val="lt1"/>
+            </a:fontRef>
+          </p:style>
+          <p:txBody>
+            <a:bodyPr rtlCol="0" anchor="ctr"/>
+            <a:lstStyle/>
+            <a:p>
+              <a:pPr algn="ctr"/>
+              <a:endParaRPr lang="ko-KR" altLang="en-US"/>
+            </a:p>
+          </p:txBody>
+        </p:sp>
+        <p:sp>
+          <p:nvSpPr>
+            <p:cNvPr id="9" name="직사각형 8">
+              <a:extLst>
+                <a:ext uri="{FF2B5EF4-FFF2-40B4-BE49-F238E27FC236}">
+                  <a16:creationId xmlns:a16="http://schemas.microsoft.com/office/drawing/2014/main" id="{515E5298-7BAB-4688-977F-BC34E7E06B26}"/>
+                </a:ext>
+              </a:extLst>
+            </p:cNvPr>
+            <p:cNvSpPr/>
+            <p:nvPr/>
+          </p:nvSpPr>
+          <p:spPr>
+            <a:xfrm>
+              <a:off x="3024436" y="3276377"/>
+              <a:ext cx="1512168" cy="855712"/>
+            </a:xfrm>
+            <a:prstGeom prst="rect">
+              <a:avLst/>
+            </a:prstGeom>
+            <a:solidFill>
+              <a:schemeClr val="bg1">
+                <a:lumMod val="75000"/>
+              </a:schemeClr>
+            </a:solidFill>
+            <a:ln>
+              <a:solidFill>
+                <a:schemeClr val="tx1"/>
+              </a:solidFill>
+            </a:ln>
+          </p:spPr>
+          <p:style>
+            <a:lnRef idx="2">
+              <a:schemeClr val="accent1">
+                <a:shade val="50000"/>
+              </a:schemeClr>
+            </a:lnRef>
+            <a:fillRef idx="1">
+              <a:schemeClr val="accent1"/>
+            </a:fillRef>
+            <a:effectRef idx="0">
+              <a:schemeClr val="accent1"/>
+            </a:effectRef>
+            <a:fontRef idx="minor">
+              <a:schemeClr val="lt1"/>
+            </a:fontRef>
+          </p:style>
+          <p:txBody>
+            <a:bodyPr rtlCol="0" anchor="ctr"/>
+            <a:lstStyle/>
+            <a:p>
+              <a:pPr algn="ctr"/>
+              <a:r>
+                <a:rPr lang="en-US" altLang="ko-KR" dirty="0">
+                  <a:solidFill>
+                    <a:schemeClr val="tx1"/>
+                  </a:solidFill>
+                </a:rPr>
+                <a:t>VNC Server</a:t>
+              </a:r>
+              <a:endParaRPr lang="ko-KR" altLang="en-US" dirty="0">
+                <a:solidFill>
+                  <a:schemeClr val="tx1"/>
+                </a:solidFill>
+              </a:endParaRPr>
+            </a:p>
+          </p:txBody>
+        </p:sp>
+        <p:sp>
+          <p:nvSpPr>
+            <p:cNvPr id="10" name="직사각형 9">
+              <a:extLst>
+                <a:ext uri="{FF2B5EF4-FFF2-40B4-BE49-F238E27FC236}">
+                  <a16:creationId xmlns:a16="http://schemas.microsoft.com/office/drawing/2014/main" id="{D9F958ED-CA55-4DD1-B43B-6AE5377892EB}"/>
+                </a:ext>
+              </a:extLst>
+            </p:cNvPr>
+            <p:cNvSpPr/>
+            <p:nvPr/>
+          </p:nvSpPr>
+          <p:spPr>
+            <a:xfrm>
+              <a:off x="6912868" y="3276377"/>
+              <a:ext cx="1512168" cy="855712"/>
+            </a:xfrm>
+            <a:prstGeom prst="rect">
+              <a:avLst/>
+            </a:prstGeom>
+            <a:solidFill>
+              <a:schemeClr val="bg1">
+                <a:lumMod val="75000"/>
+              </a:schemeClr>
+            </a:solidFill>
+            <a:ln>
+              <a:solidFill>
+                <a:schemeClr val="tx1"/>
+              </a:solidFill>
+            </a:ln>
+          </p:spPr>
+          <p:style>
+            <a:lnRef idx="2">
+              <a:schemeClr val="accent1">
+                <a:shade val="50000"/>
+              </a:schemeClr>
+            </a:lnRef>
+            <a:fillRef idx="1">
+              <a:schemeClr val="accent1"/>
+            </a:fillRef>
+            <a:effectRef idx="0">
+              <a:schemeClr val="accent1"/>
+            </a:effectRef>
+            <a:fontRef idx="minor">
+              <a:schemeClr val="lt1"/>
+            </a:fontRef>
+          </p:style>
+          <p:txBody>
+            <a:bodyPr rtlCol="0" anchor="ctr"/>
+            <a:lstStyle/>
+            <a:p>
+              <a:pPr algn="ctr"/>
+              <a:r>
+                <a:rPr lang="en-US" altLang="ko-KR" dirty="0">
+                  <a:solidFill>
+                    <a:schemeClr val="tx1"/>
+                  </a:solidFill>
+                </a:rPr>
+                <a:t>VNC Client</a:t>
+              </a:r>
+              <a:endParaRPr lang="ko-KR" altLang="en-US" dirty="0">
+                <a:solidFill>
+                  <a:schemeClr val="tx1"/>
+                </a:solidFill>
+              </a:endParaRPr>
+            </a:p>
+          </p:txBody>
+        </p:sp>
+        <p:pic>
+          <p:nvPicPr>
+            <p:cNvPr id="4" name="그래픽 3" descr="모니터">
+              <a:extLst>
+                <a:ext uri="{FF2B5EF4-FFF2-40B4-BE49-F238E27FC236}">
+                  <a16:creationId xmlns:a16="http://schemas.microsoft.com/office/drawing/2014/main" id="{1D691AB1-8BCA-48C3-8E2A-E6DF7E9787D2}"/>
+                </a:ext>
+              </a:extLst>
+            </p:cNvPr>
+            <p:cNvPicPr>
+              <a:picLocks noChangeAspect="1"/>
+            </p:cNvPicPr>
+            <p:nvPr/>
+          </p:nvPicPr>
+          <p:blipFill>
+            <a:blip r:embed="rId2">
+              <a:extLst>
+                <a:ext uri="{28A0092B-C50C-407E-A947-70E740481C1C}">
+                  <a14:useLocalDpi xmlns:a14="http://schemas.microsoft.com/office/drawing/2010/main" val="0"/>
+                </a:ext>
+                <a:ext uri="{96DAC541-7B7A-43D3-8B79-37D633B846F1}">
+                  <asvg:svgBlip xmlns:asvg="http://schemas.microsoft.com/office/drawing/2016/SVG/main" r:embed="rId3"/>
+                </a:ext>
+              </a:extLst>
+            </a:blip>
+            <a:stretch>
+              <a:fillRect/>
+            </a:stretch>
+          </p:blipFill>
+          <p:spPr>
+            <a:xfrm>
+              <a:off x="7236904" y="1044129"/>
+              <a:ext cx="1872208" cy="1872208"/>
+            </a:xfrm>
+            <a:prstGeom prst="rect">
+              <a:avLst/>
+            </a:prstGeom>
+          </p:spPr>
+        </p:pic>
+        <p:pic>
+          <p:nvPicPr>
+            <p:cNvPr id="23" name="그림 22" descr="디스플레이, 건물, 창문이(가) 표시된 사진&#10;&#10;자동 생성된 설명">
+              <a:extLst>
+                <a:ext uri="{FF2B5EF4-FFF2-40B4-BE49-F238E27FC236}">
+                  <a16:creationId xmlns:a16="http://schemas.microsoft.com/office/drawing/2014/main" id="{C864EDEC-7649-486E-907B-84C2EACFDCA3}"/>
+                </a:ext>
+              </a:extLst>
+            </p:cNvPr>
+            <p:cNvPicPr>
+              <a:picLocks noChangeAspect="1"/>
+            </p:cNvPicPr>
+            <p:nvPr/>
+          </p:nvPicPr>
+          <p:blipFill>
+            <a:blip r:embed="rId4" cstate="print">
+              <a:extLst>
+                <a:ext uri="{28A0092B-C50C-407E-A947-70E740481C1C}">
+                  <a14:useLocalDpi xmlns:a14="http://schemas.microsoft.com/office/drawing/2010/main" val="0"/>
+                </a:ext>
+              </a:extLst>
+            </a:blip>
+            <a:stretch>
+              <a:fillRect/>
+            </a:stretch>
+          </p:blipFill>
+          <p:spPr>
+            <a:xfrm>
+              <a:off x="4062348" y="1138558"/>
+              <a:ext cx="898622" cy="985691"/>
+            </a:xfrm>
+            <a:prstGeom prst="rect">
+              <a:avLst/>
+            </a:prstGeom>
+          </p:spPr>
+        </p:pic>
+        <p:pic>
+          <p:nvPicPr>
+            <p:cNvPr id="27" name="그림 26" descr="그리기이(가) 표시된 사진&#10;&#10;자동 생성된 설명">
+              <a:extLst>
+                <a:ext uri="{FF2B5EF4-FFF2-40B4-BE49-F238E27FC236}">
+                  <a16:creationId xmlns:a16="http://schemas.microsoft.com/office/drawing/2014/main" id="{BD8B7F12-6ED7-41D8-8642-15186C874A14}"/>
+                </a:ext>
+              </a:extLst>
+            </p:cNvPr>
+            <p:cNvPicPr>
+              <a:picLocks noChangeAspect="1"/>
+            </p:cNvPicPr>
+            <p:nvPr/>
+          </p:nvPicPr>
+          <p:blipFill>
+            <a:blip r:embed="rId5" cstate="print">
+              <a:extLst>
+                <a:ext uri="{28A0092B-C50C-407E-A947-70E740481C1C}">
+                  <a14:useLocalDpi xmlns:a14="http://schemas.microsoft.com/office/drawing/2010/main" val="0"/>
+                </a:ext>
+              </a:extLst>
+            </a:blip>
+            <a:stretch>
+              <a:fillRect/>
+            </a:stretch>
+          </p:blipFill>
+          <p:spPr>
+            <a:xfrm>
+              <a:off x="1980320" y="1132755"/>
+              <a:ext cx="689282" cy="847478"/>
+            </a:xfrm>
+            <a:prstGeom prst="rect">
+              <a:avLst/>
+            </a:prstGeom>
+          </p:spPr>
+        </p:pic>
+        <p:cxnSp>
+          <p:nvCxnSpPr>
+            <p:cNvPr id="29" name="직선 화살표 연결선 28">
+              <a:extLst>
+                <a:ext uri="{FF2B5EF4-FFF2-40B4-BE49-F238E27FC236}">
+                  <a16:creationId xmlns:a16="http://schemas.microsoft.com/office/drawing/2014/main" id="{070C5DFF-8183-4EA9-98B6-74581210CFFD}"/>
+                </a:ext>
+              </a:extLst>
+            </p:cNvPr>
+            <p:cNvCxnSpPr>
+              <a:cxnSpLocks/>
+            </p:cNvCxnSpPr>
+            <p:nvPr/>
+          </p:nvCxnSpPr>
+          <p:spPr>
+            <a:xfrm>
+              <a:off x="3240460" y="2523199"/>
+              <a:ext cx="0" cy="684076"/>
+            </a:xfrm>
+            <a:prstGeom prst="straightConnector1">
+              <a:avLst/>
+            </a:prstGeom>
+            <a:ln w="38100">
+              <a:tailEnd type="triangle"/>
+            </a:ln>
+          </p:spPr>
+          <p:style>
+            <a:lnRef idx="1">
+              <a:schemeClr val="accent1"/>
+            </a:lnRef>
+            <a:fillRef idx="0">
+              <a:schemeClr val="accent1"/>
+            </a:fillRef>
+            <a:effectRef idx="0">
+              <a:schemeClr val="accent1"/>
+            </a:effectRef>
+            <a:fontRef idx="minor">
+              <a:schemeClr val="tx1"/>
+            </a:fontRef>
+          </p:style>
+        </p:cxnSp>
+        <p:sp>
+          <p:nvSpPr>
+            <p:cNvPr id="30" name="직사각형 29">
+              <a:extLst>
+                <a:ext uri="{FF2B5EF4-FFF2-40B4-BE49-F238E27FC236}">
+                  <a16:creationId xmlns:a16="http://schemas.microsoft.com/office/drawing/2014/main" id="{C49FA582-7B9B-4B77-A320-AF41700CC13A}"/>
+                </a:ext>
+              </a:extLst>
+            </p:cNvPr>
+            <p:cNvSpPr/>
+            <p:nvPr/>
+          </p:nvSpPr>
+          <p:spPr>
+            <a:xfrm>
+              <a:off x="3240460" y="2700313"/>
+              <a:ext cx="1428746" cy="432048"/>
+            </a:xfrm>
+            <a:prstGeom prst="rect">
+              <a:avLst/>
+            </a:prstGeom>
+            <a:noFill/>
+            <a:ln>
+              <a:noFill/>
+            </a:ln>
+          </p:spPr>
+          <p:style>
+            <a:lnRef idx="2">
+              <a:schemeClr val="accent1">
+                <a:shade val="50000"/>
+              </a:schemeClr>
+            </a:lnRef>
+            <a:fillRef idx="1">
+              <a:schemeClr val="accent1"/>
+            </a:fillRef>
+            <a:effectRef idx="0">
+              <a:schemeClr val="accent1"/>
+            </a:effectRef>
+            <a:fontRef idx="minor">
+              <a:schemeClr val="lt1"/>
+            </a:fontRef>
+          </p:style>
+          <p:txBody>
+            <a:bodyPr rtlCol="0" anchor="ctr"/>
+            <a:lstStyle/>
+            <a:p>
+              <a:pPr algn="ctr"/>
+              <a:r>
+                <a:rPr lang="en-US" altLang="ko-KR" sz="1050" dirty="0">
+                  <a:solidFill>
+                    <a:schemeClr val="tx1"/>
+                  </a:solidFill>
+                </a:rPr>
+                <a:t>1. Send graphic data to VNC Server</a:t>
+              </a:r>
+              <a:endParaRPr lang="ko-KR" altLang="en-US" sz="1050" dirty="0">
+                <a:solidFill>
+                  <a:schemeClr val="tx1"/>
+                </a:solidFill>
+              </a:endParaRPr>
+            </a:p>
+          </p:txBody>
+        </p:sp>
+        <p:cxnSp>
+          <p:nvCxnSpPr>
+            <p:cNvPr id="32" name="직선 화살표 연결선 31">
+              <a:extLst>
+                <a:ext uri="{FF2B5EF4-FFF2-40B4-BE49-F238E27FC236}">
+                  <a16:creationId xmlns:a16="http://schemas.microsoft.com/office/drawing/2014/main" id="{C4392BE6-E891-4CD1-9F15-3E1079C7B87B}"/>
+                </a:ext>
+              </a:extLst>
+            </p:cNvPr>
+            <p:cNvCxnSpPr>
+              <a:cxnSpLocks/>
+              <a:stCxn id="9" idx="3"/>
+              <a:endCxn id="10" idx="1"/>
+            </p:cNvCxnSpPr>
+            <p:nvPr/>
+          </p:nvCxnSpPr>
+          <p:spPr>
+            <a:xfrm>
+              <a:off x="4536604" y="3704233"/>
+              <a:ext cx="2376264" cy="0"/>
+            </a:xfrm>
+            <a:prstGeom prst="straightConnector1">
+              <a:avLst/>
+            </a:prstGeom>
+            <a:ln w="38100">
+              <a:tailEnd type="triangle"/>
+            </a:ln>
+          </p:spPr>
+          <p:style>
+            <a:lnRef idx="1">
+              <a:schemeClr val="accent1"/>
+            </a:lnRef>
+            <a:fillRef idx="0">
+              <a:schemeClr val="accent1"/>
+            </a:fillRef>
+            <a:effectRef idx="0">
+              <a:schemeClr val="accent1"/>
+            </a:effectRef>
+            <a:fontRef idx="minor">
+              <a:schemeClr val="tx1"/>
+            </a:fontRef>
+          </p:style>
+        </p:cxnSp>
+        <p:cxnSp>
+          <p:nvCxnSpPr>
+            <p:cNvPr id="36" name="직선 화살표 연결선 35">
+              <a:extLst>
+                <a:ext uri="{FF2B5EF4-FFF2-40B4-BE49-F238E27FC236}">
+                  <a16:creationId xmlns:a16="http://schemas.microsoft.com/office/drawing/2014/main" id="{5AF37990-DDB2-40A9-819A-692CA350F0F3}"/>
+                </a:ext>
+              </a:extLst>
+            </p:cNvPr>
+            <p:cNvCxnSpPr>
+              <a:cxnSpLocks/>
+            </p:cNvCxnSpPr>
+            <p:nvPr/>
+          </p:nvCxnSpPr>
+          <p:spPr>
+            <a:xfrm flipV="1">
+              <a:off x="8137004" y="2586038"/>
+              <a:ext cx="0" cy="690339"/>
+            </a:xfrm>
+            <a:prstGeom prst="straightConnector1">
+              <a:avLst/>
+            </a:prstGeom>
+            <a:ln w="38100">
+              <a:tailEnd type="triangle"/>
+            </a:ln>
+          </p:spPr>
+          <p:style>
+            <a:lnRef idx="1">
+              <a:schemeClr val="accent1"/>
+            </a:lnRef>
+            <a:fillRef idx="0">
+              <a:schemeClr val="accent1"/>
+            </a:fillRef>
+            <a:effectRef idx="0">
+              <a:schemeClr val="accent1"/>
+            </a:effectRef>
+            <a:fontRef idx="minor">
+              <a:schemeClr val="tx1"/>
+            </a:fontRef>
+          </p:style>
+        </p:cxnSp>
+        <p:sp>
+          <p:nvSpPr>
+            <p:cNvPr id="40" name="직사각형 39">
+              <a:extLst>
+                <a:ext uri="{FF2B5EF4-FFF2-40B4-BE49-F238E27FC236}">
+                  <a16:creationId xmlns:a16="http://schemas.microsoft.com/office/drawing/2014/main" id="{C987D05E-576C-403F-BED1-C6EB9C7E99A5}"/>
+                </a:ext>
+              </a:extLst>
+            </p:cNvPr>
+            <p:cNvSpPr/>
+            <p:nvPr/>
+          </p:nvSpPr>
+          <p:spPr>
+            <a:xfrm>
+              <a:off x="8148418" y="2772321"/>
+              <a:ext cx="1428746" cy="432048"/>
+            </a:xfrm>
+            <a:prstGeom prst="rect">
+              <a:avLst/>
+            </a:prstGeom>
+            <a:noFill/>
+            <a:ln>
+              <a:noFill/>
+            </a:ln>
+          </p:spPr>
+          <p:style>
+            <a:lnRef idx="2">
+              <a:schemeClr val="accent1">
+                <a:shade val="50000"/>
+              </a:schemeClr>
+            </a:lnRef>
+            <a:fillRef idx="1">
+              <a:schemeClr val="accent1"/>
+            </a:fillRef>
+            <a:effectRef idx="0">
+              <a:schemeClr val="accent1"/>
+            </a:effectRef>
+            <a:fontRef idx="minor">
+              <a:schemeClr val="lt1"/>
+            </a:fontRef>
+          </p:style>
+          <p:txBody>
+            <a:bodyPr rtlCol="0" anchor="ctr"/>
+            <a:lstStyle/>
+            <a:p>
+              <a:pPr algn="ctr"/>
+              <a:r>
+                <a:rPr lang="en-US" altLang="ko-KR" sz="1050" dirty="0">
+                  <a:solidFill>
+                    <a:schemeClr val="tx1"/>
+                  </a:solidFill>
+                </a:rPr>
+                <a:t>3. Transform frame buffer and display</a:t>
+              </a:r>
+              <a:endParaRPr lang="ko-KR" altLang="en-US" sz="1050" dirty="0">
+                <a:solidFill>
+                  <a:schemeClr val="tx1"/>
+                </a:solidFill>
+              </a:endParaRPr>
+            </a:p>
+          </p:txBody>
+        </p:sp>
+        <p:sp>
+          <p:nvSpPr>
+            <p:cNvPr id="41" name="직사각형 40">
+              <a:extLst>
+                <a:ext uri="{FF2B5EF4-FFF2-40B4-BE49-F238E27FC236}">
+                  <a16:creationId xmlns:a16="http://schemas.microsoft.com/office/drawing/2014/main" id="{DC789F07-FA94-4645-B62C-6F09553188BA}"/>
+                </a:ext>
+              </a:extLst>
+            </p:cNvPr>
+            <p:cNvSpPr/>
+            <p:nvPr/>
+          </p:nvSpPr>
+          <p:spPr>
+            <a:xfrm>
+              <a:off x="4608612" y="3277674"/>
+              <a:ext cx="2232248" cy="358743"/>
+            </a:xfrm>
+            <a:prstGeom prst="rect">
+              <a:avLst/>
+            </a:prstGeom>
+            <a:noFill/>
+            <a:ln>
+              <a:noFill/>
+            </a:ln>
+          </p:spPr>
+          <p:style>
+            <a:lnRef idx="2">
+              <a:schemeClr val="accent1">
+                <a:shade val="50000"/>
+              </a:schemeClr>
+            </a:lnRef>
+            <a:fillRef idx="1">
+              <a:schemeClr val="accent1"/>
+            </a:fillRef>
+            <a:effectRef idx="0">
+              <a:schemeClr val="accent1"/>
+            </a:effectRef>
+            <a:fontRef idx="minor">
+              <a:schemeClr val="lt1"/>
+            </a:fontRef>
+          </p:style>
+          <p:txBody>
+            <a:bodyPr rtlCol="0" anchor="ctr"/>
+            <a:lstStyle/>
+            <a:p>
+              <a:pPr algn="ctr"/>
+              <a:r>
+                <a:rPr lang="en-US" altLang="ko-KR" sz="1050" dirty="0">
+                  <a:solidFill>
+                    <a:schemeClr val="tx1"/>
+                  </a:solidFill>
+                </a:rPr>
+                <a:t>2. Convert graphic data to RBF and send them to clients.</a:t>
+              </a:r>
+              <a:endParaRPr lang="ko-KR" altLang="en-US" sz="1050" dirty="0">
+                <a:solidFill>
+                  <a:schemeClr val="tx1"/>
+                </a:solidFill>
+              </a:endParaRPr>
+            </a:p>
+          </p:txBody>
+        </p:sp>
+      </p:grpSp>
+      <p:pic>
+        <p:nvPicPr>
+          <p:cNvPr id="21" name="그림 20" descr="음식이(가) 표시된 사진&#10;&#10;자동 생성된 설명">
+            <a:extLst>
+              <a:ext uri="{FF2B5EF4-FFF2-40B4-BE49-F238E27FC236}">
+                <a16:creationId xmlns:a16="http://schemas.microsoft.com/office/drawing/2014/main" id="{BF16D7F8-4A20-4914-98EA-1E7768C07997}"/>
+              </a:ext>
+            </a:extLst>
+          </p:cNvPr>
+          <p:cNvPicPr>
+            <a:picLocks noChangeAspect="1"/>
+          </p:cNvPicPr>
+          <p:nvPr/>
+        </p:nvPicPr>
+        <p:blipFill>
+          <a:blip r:embed="rId6">
+            <a:extLst>
+              <a:ext uri="{28A0092B-C50C-407E-A947-70E740481C1C}">
+                <a14:useLocalDpi xmlns:a14="http://schemas.microsoft.com/office/drawing/2010/main" val="0"/>
+              </a:ext>
+            </a:extLst>
+          </a:blip>
+          <a:stretch>
+            <a:fillRect/>
+          </a:stretch>
+        </p:blipFill>
+        <p:spPr>
+          <a:xfrm>
+            <a:off x="2633598" y="900113"/>
+            <a:ext cx="1428750" cy="1685925"/>
+          </a:xfrm>
+          <a:prstGeom prst="rect">
+            <a:avLst/>
+          </a:prstGeom>
+        </p:spPr>
+      </p:pic>
+    </p:spTree>
+    <p:extLst>
+      <p:ext uri="{BB962C8B-B14F-4D97-AF65-F5344CB8AC3E}">
+        <p14:creationId xmlns:p14="http://schemas.microsoft.com/office/powerpoint/2010/main" val="672668684"/>
+      </p:ext>
+    </p:extLst>
+  </p:cSld>
+  <p:clrMapOvr>
+    <a:masterClrMapping/>
+  </p:clrMapOvr>
+  <p:transition spd="slow" advClick="0">
+    <p:push/>
+  </p:transition>
+</p:sld>
+</file>
+
+<file path=ppt/slides/slide3.xml><?xml version="1.0" encoding="utf-8"?>
 <p:sld xmlns:a="http://schemas.openxmlformats.org/drawingml/2006/main" xmlns:r="http://schemas.openxmlformats.org/officeDocument/2006/relationships" xmlns:p="http://schemas.openxmlformats.org/presentationml/2006/main">
   <p:cSld>
     <p:spTree>
@@ -5204,7 +5997,7 @@
 </p:sld>
 </file>
 
-<file path=ppt/slides/slide3.xml><?xml version="1.0" encoding="utf-8"?>
+<file path=ppt/slides/slide4.xml><?xml version="1.0" encoding="utf-8"?>
 <p:sld xmlns:a="http://schemas.openxmlformats.org/drawingml/2006/main" xmlns:r="http://schemas.openxmlformats.org/officeDocument/2006/relationships" xmlns:p="http://schemas.openxmlformats.org/presentationml/2006/main">
   <p:cSld>
     <p:spTree>
@@ -5925,6 +6718,1053 @@
     <p:extLst>
       <p:ext uri="{BB962C8B-B14F-4D97-AF65-F5344CB8AC3E}">
         <p14:creationId xmlns:p14="http://schemas.microsoft.com/office/powerpoint/2010/main" val="2754406100"/>
+      </p:ext>
+    </p:extLst>
+  </p:cSld>
+  <p:clrMapOvr>
+    <a:masterClrMapping/>
+  </p:clrMapOvr>
+  <p:transition spd="slow" advClick="0">
+    <p:push/>
+  </p:transition>
+</p:sld>
+</file>
+
+<file path=ppt/slides/slide5.xml><?xml version="1.0" encoding="utf-8"?>
+<p:sld xmlns:a="http://schemas.openxmlformats.org/drawingml/2006/main" xmlns:r="http://schemas.openxmlformats.org/officeDocument/2006/relationships" xmlns:p="http://schemas.openxmlformats.org/presentationml/2006/main">
+  <p:cSld>
+    <p:spTree>
+      <p:nvGrpSpPr>
+        <p:cNvPr id="1" name=""/>
+        <p:cNvGrpSpPr/>
+        <p:nvPr/>
+      </p:nvGrpSpPr>
+      <p:grpSpPr>
+        <a:xfrm>
+          <a:off x="0" y="0"/>
+          <a:ext cx="0" cy="0"/>
+          <a:chOff x="0" y="0"/>
+          <a:chExt cx="0" cy="0"/>
+        </a:xfrm>
+      </p:grpSpPr>
+      <p:grpSp>
+        <p:nvGrpSpPr>
+          <p:cNvPr id="44" name="그룹 43">
+            <a:extLst>
+              <a:ext uri="{FF2B5EF4-FFF2-40B4-BE49-F238E27FC236}">
+                <a16:creationId xmlns:a16="http://schemas.microsoft.com/office/drawing/2014/main" id="{076E0D39-7D5D-44BA-84EA-2C03ED479F87}"/>
+              </a:ext>
+            </a:extLst>
+          </p:cNvPr>
+          <p:cNvGrpSpPr/>
+          <p:nvPr/>
+        </p:nvGrpSpPr>
+        <p:grpSpPr>
+          <a:xfrm>
+            <a:off x="2124336" y="1476177"/>
+            <a:ext cx="5545777" cy="3384376"/>
+            <a:chOff x="2124336" y="1476177"/>
+            <a:chExt cx="5545777" cy="3384376"/>
+          </a:xfrm>
+        </p:grpSpPr>
+        <p:sp>
+          <p:nvSpPr>
+            <p:cNvPr id="3" name="직사각형 2">
+              <a:extLst>
+                <a:ext uri="{FF2B5EF4-FFF2-40B4-BE49-F238E27FC236}">
+                  <a16:creationId xmlns:a16="http://schemas.microsoft.com/office/drawing/2014/main" id="{990F6F02-3324-4A15-875C-5DCC46BAC3A0}"/>
+                </a:ext>
+              </a:extLst>
+            </p:cNvPr>
+            <p:cNvSpPr/>
+            <p:nvPr/>
+          </p:nvSpPr>
+          <p:spPr>
+            <a:xfrm>
+              <a:off x="2124336" y="4500513"/>
+              <a:ext cx="5328592" cy="360040"/>
+            </a:xfrm>
+            <a:prstGeom prst="rect">
+              <a:avLst/>
+            </a:prstGeom>
+            <a:solidFill>
+              <a:schemeClr val="bg1">
+                <a:lumMod val="75000"/>
+              </a:schemeClr>
+            </a:solidFill>
+            <a:ln>
+              <a:solidFill>
+                <a:schemeClr val="tx1"/>
+              </a:solidFill>
+            </a:ln>
+          </p:spPr>
+          <p:style>
+            <a:lnRef idx="2">
+              <a:schemeClr val="accent1">
+                <a:shade val="50000"/>
+              </a:schemeClr>
+            </a:lnRef>
+            <a:fillRef idx="1">
+              <a:schemeClr val="accent1"/>
+            </a:fillRef>
+            <a:effectRef idx="0">
+              <a:schemeClr val="accent1"/>
+            </a:effectRef>
+            <a:fontRef idx="minor">
+              <a:schemeClr val="lt1"/>
+            </a:fontRef>
+          </p:style>
+          <p:txBody>
+            <a:bodyPr rtlCol="0" anchor="ctr"/>
+            <a:lstStyle/>
+            <a:p>
+              <a:pPr algn="ctr"/>
+              <a:r>
+                <a:rPr lang="en-US" altLang="ko-KR" sz="1400" dirty="0">
+                  <a:solidFill>
+                    <a:schemeClr val="tx1"/>
+                  </a:solidFill>
+                </a:rPr>
+                <a:t>TCP/IP Protocol</a:t>
+              </a:r>
+              <a:endParaRPr lang="ko-KR" altLang="en-US" sz="1400" dirty="0">
+                <a:solidFill>
+                  <a:schemeClr val="tx1"/>
+                </a:solidFill>
+              </a:endParaRPr>
+            </a:p>
+          </p:txBody>
+        </p:sp>
+        <p:sp>
+          <p:nvSpPr>
+            <p:cNvPr id="17" name="직사각형 16">
+              <a:extLst>
+                <a:ext uri="{FF2B5EF4-FFF2-40B4-BE49-F238E27FC236}">
+                  <a16:creationId xmlns:a16="http://schemas.microsoft.com/office/drawing/2014/main" id="{3FCE93D7-2831-4D6A-A21C-4B5B8A31A69C}"/>
+                </a:ext>
+              </a:extLst>
+            </p:cNvPr>
+            <p:cNvSpPr/>
+            <p:nvPr/>
+          </p:nvSpPr>
+          <p:spPr>
+            <a:xfrm>
+              <a:off x="2124336" y="3996457"/>
+              <a:ext cx="5328592" cy="360040"/>
+            </a:xfrm>
+            <a:prstGeom prst="rect">
+              <a:avLst/>
+            </a:prstGeom>
+            <a:solidFill>
+              <a:schemeClr val="bg1">
+                <a:lumMod val="75000"/>
+              </a:schemeClr>
+            </a:solidFill>
+            <a:ln>
+              <a:solidFill>
+                <a:schemeClr val="tx1"/>
+              </a:solidFill>
+            </a:ln>
+          </p:spPr>
+          <p:style>
+            <a:lnRef idx="2">
+              <a:schemeClr val="accent1">
+                <a:shade val="50000"/>
+              </a:schemeClr>
+            </a:lnRef>
+            <a:fillRef idx="1">
+              <a:schemeClr val="accent1"/>
+            </a:fillRef>
+            <a:effectRef idx="0">
+              <a:schemeClr val="accent1"/>
+            </a:effectRef>
+            <a:fontRef idx="minor">
+              <a:schemeClr val="lt1"/>
+            </a:fontRef>
+          </p:style>
+          <p:txBody>
+            <a:bodyPr rtlCol="0" anchor="ctr"/>
+            <a:lstStyle/>
+            <a:p>
+              <a:pPr algn="ctr"/>
+              <a:r>
+                <a:rPr lang="en-US" altLang="ko-KR" sz="1400" dirty="0">
+                  <a:solidFill>
+                    <a:schemeClr val="tx1"/>
+                  </a:solidFill>
+                </a:rPr>
+                <a:t>RDP Protocol</a:t>
+              </a:r>
+              <a:endParaRPr lang="ko-KR" altLang="en-US" sz="1400" dirty="0">
+                <a:solidFill>
+                  <a:schemeClr val="tx1"/>
+                </a:solidFill>
+              </a:endParaRPr>
+            </a:p>
+          </p:txBody>
+        </p:sp>
+        <p:sp>
+          <p:nvSpPr>
+            <p:cNvPr id="18" name="직사각형 17">
+              <a:extLst>
+                <a:ext uri="{FF2B5EF4-FFF2-40B4-BE49-F238E27FC236}">
+                  <a16:creationId xmlns:a16="http://schemas.microsoft.com/office/drawing/2014/main" id="{39EE788B-2134-4D13-92FA-4796E5750C9C}"/>
+                </a:ext>
+              </a:extLst>
+            </p:cNvPr>
+            <p:cNvSpPr/>
+            <p:nvPr/>
+          </p:nvSpPr>
+          <p:spPr>
+            <a:xfrm>
+              <a:off x="2124336" y="3024349"/>
+              <a:ext cx="5328592" cy="360040"/>
+            </a:xfrm>
+            <a:prstGeom prst="rect">
+              <a:avLst/>
+            </a:prstGeom>
+            <a:solidFill>
+              <a:schemeClr val="bg1">
+                <a:lumMod val="75000"/>
+              </a:schemeClr>
+            </a:solidFill>
+            <a:ln>
+              <a:solidFill>
+                <a:schemeClr val="tx1"/>
+              </a:solidFill>
+            </a:ln>
+          </p:spPr>
+          <p:style>
+            <a:lnRef idx="2">
+              <a:schemeClr val="accent1">
+                <a:shade val="50000"/>
+              </a:schemeClr>
+            </a:lnRef>
+            <a:fillRef idx="1">
+              <a:schemeClr val="accent1"/>
+            </a:fillRef>
+            <a:effectRef idx="0">
+              <a:schemeClr val="accent1"/>
+            </a:effectRef>
+            <a:fontRef idx="minor">
+              <a:schemeClr val="lt1"/>
+            </a:fontRef>
+          </p:style>
+          <p:txBody>
+            <a:bodyPr rtlCol="0" anchor="ctr"/>
+            <a:lstStyle/>
+            <a:p>
+              <a:pPr algn="ctr"/>
+              <a:r>
+                <a:rPr lang="en-US" altLang="ko-KR" sz="1400" dirty="0">
+                  <a:solidFill>
+                    <a:schemeClr val="tx1"/>
+                  </a:solidFill>
+                </a:rPr>
+                <a:t>Session Management</a:t>
+              </a:r>
+              <a:endParaRPr lang="ko-KR" altLang="en-US" sz="1400" dirty="0">
+                <a:solidFill>
+                  <a:schemeClr val="tx1"/>
+                </a:solidFill>
+              </a:endParaRPr>
+            </a:p>
+          </p:txBody>
+        </p:sp>
+        <p:sp>
+          <p:nvSpPr>
+            <p:cNvPr id="22" name="직사각형 21">
+              <a:extLst>
+                <a:ext uri="{FF2B5EF4-FFF2-40B4-BE49-F238E27FC236}">
+                  <a16:creationId xmlns:a16="http://schemas.microsoft.com/office/drawing/2014/main" id="{FBC960C3-C429-42E6-83B5-34C5BD2FB383}"/>
+                </a:ext>
+              </a:extLst>
+            </p:cNvPr>
+            <p:cNvSpPr/>
+            <p:nvPr/>
+          </p:nvSpPr>
+          <p:spPr>
+            <a:xfrm>
+              <a:off x="4536604" y="1476177"/>
+              <a:ext cx="2232248" cy="1224136"/>
+            </a:xfrm>
+            <a:prstGeom prst="rect">
+              <a:avLst/>
+            </a:prstGeom>
+            <a:solidFill>
+              <a:schemeClr val="tx1">
+                <a:lumMod val="50000"/>
+                <a:lumOff val="50000"/>
+              </a:schemeClr>
+            </a:solidFill>
+            <a:ln>
+              <a:solidFill>
+                <a:schemeClr val="tx1"/>
+              </a:solidFill>
+            </a:ln>
+          </p:spPr>
+          <p:style>
+            <a:lnRef idx="2">
+              <a:schemeClr val="accent1">
+                <a:shade val="50000"/>
+              </a:schemeClr>
+            </a:lnRef>
+            <a:fillRef idx="1">
+              <a:schemeClr val="accent1"/>
+            </a:fillRef>
+            <a:effectRef idx="0">
+              <a:schemeClr val="accent1"/>
+            </a:effectRef>
+            <a:fontRef idx="minor">
+              <a:schemeClr val="lt1"/>
+            </a:fontRef>
+          </p:style>
+          <p:txBody>
+            <a:bodyPr rtlCol="0" anchor="ctr"/>
+            <a:lstStyle/>
+            <a:p>
+              <a:pPr algn="ctr"/>
+              <a:r>
+                <a:rPr lang="en-US" altLang="ko-KR" sz="1400" dirty="0">
+                  <a:solidFill>
+                    <a:schemeClr val="tx1"/>
+                  </a:solidFill>
+                </a:rPr>
+                <a:t>User Session</a:t>
+              </a:r>
+            </a:p>
+            <a:p>
+              <a:pPr algn="ctr"/>
+              <a:endParaRPr lang="en-US" altLang="ko-KR" sz="1400" dirty="0">
+                <a:solidFill>
+                  <a:schemeClr val="tx1"/>
+                </a:solidFill>
+              </a:endParaRPr>
+            </a:p>
+            <a:p>
+              <a:pPr algn="ctr"/>
+              <a:endParaRPr lang="en-US" altLang="ko-KR" sz="1400" dirty="0">
+                <a:solidFill>
+                  <a:schemeClr val="tx1"/>
+                </a:solidFill>
+              </a:endParaRPr>
+            </a:p>
+            <a:p>
+              <a:pPr algn="ctr"/>
+              <a:endParaRPr lang="en-US" altLang="ko-KR" sz="1400" dirty="0">
+                <a:solidFill>
+                  <a:schemeClr val="tx1"/>
+                </a:solidFill>
+              </a:endParaRPr>
+            </a:p>
+            <a:p>
+              <a:pPr algn="ctr"/>
+              <a:endParaRPr lang="ko-KR" altLang="en-US" sz="1400" dirty="0">
+                <a:solidFill>
+                  <a:schemeClr val="tx1"/>
+                </a:solidFill>
+              </a:endParaRPr>
+            </a:p>
+          </p:txBody>
+        </p:sp>
+        <p:sp>
+          <p:nvSpPr>
+            <p:cNvPr id="24" name="직사각형 23">
+              <a:extLst>
+                <a:ext uri="{FF2B5EF4-FFF2-40B4-BE49-F238E27FC236}">
+                  <a16:creationId xmlns:a16="http://schemas.microsoft.com/office/drawing/2014/main" id="{9685A007-F518-4334-AC27-20542C1A89F2}"/>
+                </a:ext>
+              </a:extLst>
+            </p:cNvPr>
+            <p:cNvSpPr/>
+            <p:nvPr/>
+          </p:nvSpPr>
+          <p:spPr>
+            <a:xfrm>
+              <a:off x="4608612" y="1988617"/>
+              <a:ext cx="973269" cy="639688"/>
+            </a:xfrm>
+            <a:prstGeom prst="rect">
+              <a:avLst/>
+            </a:prstGeom>
+            <a:solidFill>
+              <a:schemeClr val="bg1">
+                <a:lumMod val="75000"/>
+              </a:schemeClr>
+            </a:solidFill>
+            <a:ln>
+              <a:solidFill>
+                <a:schemeClr val="tx1"/>
+              </a:solidFill>
+            </a:ln>
+          </p:spPr>
+          <p:style>
+            <a:lnRef idx="2">
+              <a:schemeClr val="accent1">
+                <a:shade val="50000"/>
+              </a:schemeClr>
+            </a:lnRef>
+            <a:fillRef idx="1">
+              <a:schemeClr val="accent1"/>
+            </a:fillRef>
+            <a:effectRef idx="0">
+              <a:schemeClr val="accent1"/>
+            </a:effectRef>
+            <a:fontRef idx="minor">
+              <a:schemeClr val="lt1"/>
+            </a:fontRef>
+          </p:style>
+          <p:txBody>
+            <a:bodyPr rtlCol="0" anchor="ctr"/>
+            <a:lstStyle/>
+            <a:p>
+              <a:pPr algn="ctr"/>
+              <a:r>
+                <a:rPr lang="en-US" altLang="ko-KR" sz="1400" dirty="0">
+                  <a:solidFill>
+                    <a:schemeClr val="tx1"/>
+                  </a:solidFill>
+                </a:rPr>
+                <a:t>Graphics</a:t>
+              </a:r>
+            </a:p>
+          </p:txBody>
+        </p:sp>
+        <p:sp>
+          <p:nvSpPr>
+            <p:cNvPr id="25" name="직사각형 24">
+              <a:extLst>
+                <a:ext uri="{FF2B5EF4-FFF2-40B4-BE49-F238E27FC236}">
+                  <a16:creationId xmlns:a16="http://schemas.microsoft.com/office/drawing/2014/main" id="{96DA5B30-B875-4DBB-8089-AB0FF063ABA3}"/>
+                </a:ext>
+              </a:extLst>
+            </p:cNvPr>
+            <p:cNvSpPr/>
+            <p:nvPr/>
+          </p:nvSpPr>
+          <p:spPr>
+            <a:xfrm>
+              <a:off x="5723575" y="1980233"/>
+              <a:ext cx="973269" cy="639688"/>
+            </a:xfrm>
+            <a:prstGeom prst="rect">
+              <a:avLst/>
+            </a:prstGeom>
+            <a:solidFill>
+              <a:schemeClr val="bg1">
+                <a:lumMod val="75000"/>
+              </a:schemeClr>
+            </a:solidFill>
+            <a:ln>
+              <a:solidFill>
+                <a:schemeClr val="tx1"/>
+              </a:solidFill>
+            </a:ln>
+          </p:spPr>
+          <p:style>
+            <a:lnRef idx="2">
+              <a:schemeClr val="accent1">
+                <a:shade val="50000"/>
+              </a:schemeClr>
+            </a:lnRef>
+            <a:fillRef idx="1">
+              <a:schemeClr val="accent1"/>
+            </a:fillRef>
+            <a:effectRef idx="0">
+              <a:schemeClr val="accent1"/>
+            </a:effectRef>
+            <a:fontRef idx="minor">
+              <a:schemeClr val="lt1"/>
+            </a:fontRef>
+          </p:style>
+          <p:txBody>
+            <a:bodyPr rtlCol="0" anchor="ctr"/>
+            <a:lstStyle/>
+            <a:p>
+              <a:pPr algn="ctr"/>
+              <a:r>
+                <a:rPr lang="en-US" altLang="ko-KR" sz="1400" dirty="0">
+                  <a:solidFill>
+                    <a:schemeClr val="tx1"/>
+                  </a:solidFill>
+                </a:rPr>
+                <a:t>Keyboard Mouse</a:t>
+              </a:r>
+            </a:p>
+          </p:txBody>
+        </p:sp>
+        <p:sp>
+          <p:nvSpPr>
+            <p:cNvPr id="26" name="직사각형 25">
+              <a:extLst>
+                <a:ext uri="{FF2B5EF4-FFF2-40B4-BE49-F238E27FC236}">
+                  <a16:creationId xmlns:a16="http://schemas.microsoft.com/office/drawing/2014/main" id="{5DBCE3B0-649A-4DE1-BD1D-C2B61CB90FC9}"/>
+                </a:ext>
+              </a:extLst>
+            </p:cNvPr>
+            <p:cNvSpPr/>
+            <p:nvPr/>
+          </p:nvSpPr>
+          <p:spPr>
+            <a:xfrm>
+              <a:off x="2124336" y="1476177"/>
+              <a:ext cx="2232248" cy="1224136"/>
+            </a:xfrm>
+            <a:prstGeom prst="rect">
+              <a:avLst/>
+            </a:prstGeom>
+            <a:solidFill>
+              <a:schemeClr val="tx1">
+                <a:lumMod val="50000"/>
+                <a:lumOff val="50000"/>
+              </a:schemeClr>
+            </a:solidFill>
+            <a:ln>
+              <a:solidFill>
+                <a:schemeClr val="tx1"/>
+              </a:solidFill>
+            </a:ln>
+          </p:spPr>
+          <p:style>
+            <a:lnRef idx="2">
+              <a:schemeClr val="accent1">
+                <a:shade val="50000"/>
+              </a:schemeClr>
+            </a:lnRef>
+            <a:fillRef idx="1">
+              <a:schemeClr val="accent1"/>
+            </a:fillRef>
+            <a:effectRef idx="0">
+              <a:schemeClr val="accent1"/>
+            </a:effectRef>
+            <a:fontRef idx="minor">
+              <a:schemeClr val="lt1"/>
+            </a:fontRef>
+          </p:style>
+          <p:txBody>
+            <a:bodyPr rtlCol="0" anchor="ctr"/>
+            <a:lstStyle/>
+            <a:p>
+              <a:pPr algn="ctr"/>
+              <a:r>
+                <a:rPr lang="en-US" altLang="ko-KR" sz="1400" dirty="0">
+                  <a:solidFill>
+                    <a:schemeClr val="tx1"/>
+                  </a:solidFill>
+                </a:rPr>
+                <a:t>User Session</a:t>
+              </a:r>
+            </a:p>
+            <a:p>
+              <a:pPr algn="ctr"/>
+              <a:endParaRPr lang="en-US" altLang="ko-KR" sz="1400" dirty="0">
+                <a:solidFill>
+                  <a:schemeClr val="tx1"/>
+                </a:solidFill>
+              </a:endParaRPr>
+            </a:p>
+            <a:p>
+              <a:pPr algn="ctr"/>
+              <a:endParaRPr lang="en-US" altLang="ko-KR" sz="1400" dirty="0">
+                <a:solidFill>
+                  <a:schemeClr val="tx1"/>
+                </a:solidFill>
+              </a:endParaRPr>
+            </a:p>
+            <a:p>
+              <a:pPr algn="ctr"/>
+              <a:endParaRPr lang="en-US" altLang="ko-KR" sz="1400" dirty="0">
+                <a:solidFill>
+                  <a:schemeClr val="tx1"/>
+                </a:solidFill>
+              </a:endParaRPr>
+            </a:p>
+            <a:p>
+              <a:pPr algn="ctr"/>
+              <a:endParaRPr lang="ko-KR" altLang="en-US" sz="1400" dirty="0">
+                <a:solidFill>
+                  <a:schemeClr val="tx1"/>
+                </a:solidFill>
+              </a:endParaRPr>
+            </a:p>
+          </p:txBody>
+        </p:sp>
+        <p:sp>
+          <p:nvSpPr>
+            <p:cNvPr id="28" name="직사각형 27">
+              <a:extLst>
+                <a:ext uri="{FF2B5EF4-FFF2-40B4-BE49-F238E27FC236}">
+                  <a16:creationId xmlns:a16="http://schemas.microsoft.com/office/drawing/2014/main" id="{90350049-BF8E-4631-8D7D-E5A36F3EF412}"/>
+                </a:ext>
+              </a:extLst>
+            </p:cNvPr>
+            <p:cNvSpPr/>
+            <p:nvPr/>
+          </p:nvSpPr>
+          <p:spPr>
+            <a:xfrm>
+              <a:off x="2196344" y="1988617"/>
+              <a:ext cx="973269" cy="639688"/>
+            </a:xfrm>
+            <a:prstGeom prst="rect">
+              <a:avLst/>
+            </a:prstGeom>
+            <a:solidFill>
+              <a:schemeClr val="bg1">
+                <a:lumMod val="75000"/>
+              </a:schemeClr>
+            </a:solidFill>
+            <a:ln>
+              <a:solidFill>
+                <a:schemeClr val="tx1"/>
+              </a:solidFill>
+            </a:ln>
+          </p:spPr>
+          <p:style>
+            <a:lnRef idx="2">
+              <a:schemeClr val="accent1">
+                <a:shade val="50000"/>
+              </a:schemeClr>
+            </a:lnRef>
+            <a:fillRef idx="1">
+              <a:schemeClr val="accent1"/>
+            </a:fillRef>
+            <a:effectRef idx="0">
+              <a:schemeClr val="accent1"/>
+            </a:effectRef>
+            <a:fontRef idx="minor">
+              <a:schemeClr val="lt1"/>
+            </a:fontRef>
+          </p:style>
+          <p:txBody>
+            <a:bodyPr rtlCol="0" anchor="ctr"/>
+            <a:lstStyle/>
+            <a:p>
+              <a:pPr algn="ctr"/>
+              <a:r>
+                <a:rPr lang="en-US" altLang="ko-KR" sz="1400" dirty="0">
+                  <a:solidFill>
+                    <a:schemeClr val="tx1"/>
+                  </a:solidFill>
+                </a:rPr>
+                <a:t>Graphics</a:t>
+              </a:r>
+            </a:p>
+          </p:txBody>
+        </p:sp>
+        <p:sp>
+          <p:nvSpPr>
+            <p:cNvPr id="31" name="직사각형 30">
+              <a:extLst>
+                <a:ext uri="{FF2B5EF4-FFF2-40B4-BE49-F238E27FC236}">
+                  <a16:creationId xmlns:a16="http://schemas.microsoft.com/office/drawing/2014/main" id="{AA1A5544-55EE-420D-BEF0-679244985554}"/>
+                </a:ext>
+              </a:extLst>
+            </p:cNvPr>
+            <p:cNvSpPr/>
+            <p:nvPr/>
+          </p:nvSpPr>
+          <p:spPr>
+            <a:xfrm>
+              <a:off x="3311307" y="1980233"/>
+              <a:ext cx="973269" cy="639688"/>
+            </a:xfrm>
+            <a:prstGeom prst="rect">
+              <a:avLst/>
+            </a:prstGeom>
+            <a:solidFill>
+              <a:schemeClr val="bg1">
+                <a:lumMod val="75000"/>
+              </a:schemeClr>
+            </a:solidFill>
+            <a:ln>
+              <a:solidFill>
+                <a:schemeClr val="tx1"/>
+              </a:solidFill>
+            </a:ln>
+          </p:spPr>
+          <p:style>
+            <a:lnRef idx="2">
+              <a:schemeClr val="accent1">
+                <a:shade val="50000"/>
+              </a:schemeClr>
+            </a:lnRef>
+            <a:fillRef idx="1">
+              <a:schemeClr val="accent1"/>
+            </a:fillRef>
+            <a:effectRef idx="0">
+              <a:schemeClr val="accent1"/>
+            </a:effectRef>
+            <a:fontRef idx="minor">
+              <a:schemeClr val="lt1"/>
+            </a:fontRef>
+          </p:style>
+          <p:txBody>
+            <a:bodyPr rtlCol="0" anchor="ctr"/>
+            <a:lstStyle/>
+            <a:p>
+              <a:pPr algn="ctr"/>
+              <a:r>
+                <a:rPr lang="en-US" altLang="ko-KR" sz="1400" dirty="0">
+                  <a:solidFill>
+                    <a:schemeClr val="tx1"/>
+                  </a:solidFill>
+                </a:rPr>
+                <a:t>Keyboard Mouse</a:t>
+              </a:r>
+            </a:p>
+          </p:txBody>
+        </p:sp>
+        <p:sp>
+          <p:nvSpPr>
+            <p:cNvPr id="33" name="직사각형 32">
+              <a:extLst>
+                <a:ext uri="{FF2B5EF4-FFF2-40B4-BE49-F238E27FC236}">
+                  <a16:creationId xmlns:a16="http://schemas.microsoft.com/office/drawing/2014/main" id="{7032E742-A1CA-45B2-82C2-9097B98F63DB}"/>
+                </a:ext>
+              </a:extLst>
+            </p:cNvPr>
+            <p:cNvSpPr/>
+            <p:nvPr/>
+          </p:nvSpPr>
+          <p:spPr>
+            <a:xfrm>
+              <a:off x="6696844" y="1709946"/>
+              <a:ext cx="973269" cy="639688"/>
+            </a:xfrm>
+            <a:prstGeom prst="rect">
+              <a:avLst/>
+            </a:prstGeom>
+            <a:noFill/>
+            <a:ln>
+              <a:noFill/>
+            </a:ln>
+          </p:spPr>
+          <p:style>
+            <a:lnRef idx="2">
+              <a:schemeClr val="accent1">
+                <a:shade val="50000"/>
+              </a:schemeClr>
+            </a:lnRef>
+            <a:fillRef idx="1">
+              <a:schemeClr val="accent1"/>
+            </a:fillRef>
+            <a:effectRef idx="0">
+              <a:schemeClr val="accent1"/>
+            </a:effectRef>
+            <a:fontRef idx="minor">
+              <a:schemeClr val="lt1"/>
+            </a:fontRef>
+          </p:style>
+          <p:txBody>
+            <a:bodyPr rtlCol="0" anchor="ctr"/>
+            <a:lstStyle/>
+            <a:p>
+              <a:pPr algn="ctr"/>
+              <a:r>
+                <a:rPr lang="en-US" altLang="ko-KR" sz="2000" b="1" dirty="0">
+                  <a:solidFill>
+                    <a:schemeClr val="tx1"/>
+                  </a:solidFill>
+                </a:rPr>
+                <a:t>…</a:t>
+              </a:r>
+            </a:p>
+          </p:txBody>
+        </p:sp>
+        <p:cxnSp>
+          <p:nvCxnSpPr>
+            <p:cNvPr id="8" name="직선 연결선 7">
+              <a:extLst>
+                <a:ext uri="{FF2B5EF4-FFF2-40B4-BE49-F238E27FC236}">
+                  <a16:creationId xmlns:a16="http://schemas.microsoft.com/office/drawing/2014/main" id="{D8BFC1BF-9D84-4F18-8CD0-70A137780E47}"/>
+                </a:ext>
+              </a:extLst>
+            </p:cNvPr>
+            <p:cNvCxnSpPr>
+              <a:cxnSpLocks/>
+            </p:cNvCxnSpPr>
+            <p:nvPr/>
+          </p:nvCxnSpPr>
+          <p:spPr>
+            <a:xfrm>
+              <a:off x="3240460" y="2700313"/>
+              <a:ext cx="0" cy="324036"/>
+            </a:xfrm>
+            <a:prstGeom prst="line">
+              <a:avLst/>
+            </a:prstGeom>
+            <a:ln w="28575">
+              <a:solidFill>
+                <a:schemeClr val="tx1"/>
+              </a:solidFill>
+            </a:ln>
+          </p:spPr>
+          <p:style>
+            <a:lnRef idx="1">
+              <a:schemeClr val="accent1"/>
+            </a:lnRef>
+            <a:fillRef idx="0">
+              <a:schemeClr val="accent1"/>
+            </a:fillRef>
+            <a:effectRef idx="0">
+              <a:schemeClr val="accent1"/>
+            </a:effectRef>
+            <a:fontRef idx="minor">
+              <a:schemeClr val="tx1"/>
+            </a:fontRef>
+          </p:style>
+        </p:cxnSp>
+        <p:cxnSp>
+          <p:nvCxnSpPr>
+            <p:cNvPr id="34" name="직선 연결선 33">
+              <a:extLst>
+                <a:ext uri="{FF2B5EF4-FFF2-40B4-BE49-F238E27FC236}">
+                  <a16:creationId xmlns:a16="http://schemas.microsoft.com/office/drawing/2014/main" id="{9F48612B-17D0-4B8A-80A4-933313DDF9F2}"/>
+                </a:ext>
+              </a:extLst>
+            </p:cNvPr>
+            <p:cNvCxnSpPr>
+              <a:cxnSpLocks/>
+            </p:cNvCxnSpPr>
+            <p:nvPr/>
+          </p:nvCxnSpPr>
+          <p:spPr>
+            <a:xfrm>
+              <a:off x="5688732" y="2700313"/>
+              <a:ext cx="0" cy="324036"/>
+            </a:xfrm>
+            <a:prstGeom prst="line">
+              <a:avLst/>
+            </a:prstGeom>
+            <a:ln w="28575">
+              <a:solidFill>
+                <a:schemeClr val="tx1"/>
+              </a:solidFill>
+            </a:ln>
+          </p:spPr>
+          <p:style>
+            <a:lnRef idx="1">
+              <a:schemeClr val="accent1"/>
+            </a:lnRef>
+            <a:fillRef idx="0">
+              <a:schemeClr val="accent1"/>
+            </a:fillRef>
+            <a:effectRef idx="0">
+              <a:schemeClr val="accent1"/>
+            </a:effectRef>
+            <a:fontRef idx="minor">
+              <a:schemeClr val="tx1"/>
+            </a:fontRef>
+          </p:style>
+        </p:cxnSp>
+        <p:cxnSp>
+          <p:nvCxnSpPr>
+            <p:cNvPr id="35" name="직선 연결선 34">
+              <a:extLst>
+                <a:ext uri="{FF2B5EF4-FFF2-40B4-BE49-F238E27FC236}">
+                  <a16:creationId xmlns:a16="http://schemas.microsoft.com/office/drawing/2014/main" id="{3342FFAA-18D1-4BD2-BC7F-685D8C6403FC}"/>
+                </a:ext>
+              </a:extLst>
+            </p:cNvPr>
+            <p:cNvCxnSpPr>
+              <a:cxnSpLocks/>
+              <a:endCxn id="17" idx="0"/>
+            </p:cNvCxnSpPr>
+            <p:nvPr/>
+          </p:nvCxnSpPr>
+          <p:spPr>
+            <a:xfrm>
+              <a:off x="4788632" y="3852441"/>
+              <a:ext cx="0" cy="144016"/>
+            </a:xfrm>
+            <a:prstGeom prst="line">
+              <a:avLst/>
+            </a:prstGeom>
+            <a:ln w="28575">
+              <a:solidFill>
+                <a:schemeClr val="tx1"/>
+              </a:solidFill>
+            </a:ln>
+          </p:spPr>
+          <p:style>
+            <a:lnRef idx="1">
+              <a:schemeClr val="accent1"/>
+            </a:lnRef>
+            <a:fillRef idx="0">
+              <a:schemeClr val="accent1"/>
+            </a:fillRef>
+            <a:effectRef idx="0">
+              <a:schemeClr val="accent1"/>
+            </a:effectRef>
+            <a:fontRef idx="minor">
+              <a:schemeClr val="tx1"/>
+            </a:fontRef>
+          </p:style>
+        </p:cxnSp>
+        <p:cxnSp>
+          <p:nvCxnSpPr>
+            <p:cNvPr id="37" name="직선 연결선 36">
+              <a:extLst>
+                <a:ext uri="{FF2B5EF4-FFF2-40B4-BE49-F238E27FC236}">
+                  <a16:creationId xmlns:a16="http://schemas.microsoft.com/office/drawing/2014/main" id="{CF28A546-8DBF-4D89-A619-9831A83A198F}"/>
+                </a:ext>
+              </a:extLst>
+            </p:cNvPr>
+            <p:cNvCxnSpPr>
+              <a:cxnSpLocks/>
+              <a:stCxn id="17" idx="2"/>
+              <a:endCxn id="3" idx="0"/>
+            </p:cNvCxnSpPr>
+            <p:nvPr/>
+          </p:nvCxnSpPr>
+          <p:spPr>
+            <a:xfrm>
+              <a:off x="4788632" y="4356497"/>
+              <a:ext cx="0" cy="144016"/>
+            </a:xfrm>
+            <a:prstGeom prst="line">
+              <a:avLst/>
+            </a:prstGeom>
+            <a:ln w="28575">
+              <a:solidFill>
+                <a:schemeClr val="tx1"/>
+              </a:solidFill>
+            </a:ln>
+          </p:spPr>
+          <p:style>
+            <a:lnRef idx="1">
+              <a:schemeClr val="accent1"/>
+            </a:lnRef>
+            <a:fillRef idx="0">
+              <a:schemeClr val="accent1"/>
+            </a:fillRef>
+            <a:effectRef idx="0">
+              <a:schemeClr val="accent1"/>
+            </a:effectRef>
+            <a:fontRef idx="minor">
+              <a:schemeClr val="tx1"/>
+            </a:fontRef>
+          </p:style>
+        </p:cxnSp>
+        <p:sp>
+          <p:nvSpPr>
+            <p:cNvPr id="42" name="직사각형 41">
+              <a:extLst>
+                <a:ext uri="{FF2B5EF4-FFF2-40B4-BE49-F238E27FC236}">
+                  <a16:creationId xmlns:a16="http://schemas.microsoft.com/office/drawing/2014/main" id="{AFF6E565-6012-4B61-9B9C-BECA0604D1E1}"/>
+                </a:ext>
+              </a:extLst>
+            </p:cNvPr>
+            <p:cNvSpPr/>
+            <p:nvPr/>
+          </p:nvSpPr>
+          <p:spPr>
+            <a:xfrm>
+              <a:off x="2124336" y="3503922"/>
+              <a:ext cx="5328592" cy="360040"/>
+            </a:xfrm>
+            <a:prstGeom prst="rect">
+              <a:avLst/>
+            </a:prstGeom>
+            <a:solidFill>
+              <a:schemeClr val="bg1">
+                <a:lumMod val="75000"/>
+              </a:schemeClr>
+            </a:solidFill>
+            <a:ln>
+              <a:solidFill>
+                <a:schemeClr val="tx1"/>
+              </a:solidFill>
+            </a:ln>
+          </p:spPr>
+          <p:style>
+            <a:lnRef idx="2">
+              <a:schemeClr val="accent1">
+                <a:shade val="50000"/>
+              </a:schemeClr>
+            </a:lnRef>
+            <a:fillRef idx="1">
+              <a:schemeClr val="accent1"/>
+            </a:fillRef>
+            <a:effectRef idx="0">
+              <a:schemeClr val="accent1"/>
+            </a:effectRef>
+            <a:fontRef idx="minor">
+              <a:schemeClr val="lt1"/>
+            </a:fontRef>
+          </p:style>
+          <p:txBody>
+            <a:bodyPr rtlCol="0" anchor="ctr"/>
+            <a:lstStyle/>
+            <a:p>
+              <a:pPr algn="ctr"/>
+              <a:r>
+                <a:rPr lang="en-US" altLang="ko-KR" sz="1400" dirty="0">
+                  <a:solidFill>
+                    <a:schemeClr val="tx1"/>
+                  </a:solidFill>
+                </a:rPr>
+                <a:t>RDP Graphic Driver </a:t>
+              </a:r>
+              <a:endParaRPr lang="ko-KR" altLang="en-US" sz="1400" dirty="0">
+                <a:solidFill>
+                  <a:schemeClr val="tx1"/>
+                </a:solidFill>
+              </a:endParaRPr>
+            </a:p>
+          </p:txBody>
+        </p:sp>
+        <p:cxnSp>
+          <p:nvCxnSpPr>
+            <p:cNvPr id="43" name="직선 연결선 42">
+              <a:extLst>
+                <a:ext uri="{FF2B5EF4-FFF2-40B4-BE49-F238E27FC236}">
+                  <a16:creationId xmlns:a16="http://schemas.microsoft.com/office/drawing/2014/main" id="{7847AEE6-08FD-44DB-8A4F-7558BBA399B7}"/>
+                </a:ext>
+              </a:extLst>
+            </p:cNvPr>
+            <p:cNvCxnSpPr>
+              <a:cxnSpLocks/>
+              <a:stCxn id="18" idx="2"/>
+              <a:endCxn id="42" idx="0"/>
+            </p:cNvCxnSpPr>
+            <p:nvPr/>
+          </p:nvCxnSpPr>
+          <p:spPr>
+            <a:xfrm>
+              <a:off x="4788632" y="3384389"/>
+              <a:ext cx="0" cy="119533"/>
+            </a:xfrm>
+            <a:prstGeom prst="line">
+              <a:avLst/>
+            </a:prstGeom>
+            <a:ln w="28575">
+              <a:solidFill>
+                <a:schemeClr val="tx1"/>
+              </a:solidFill>
+            </a:ln>
+          </p:spPr>
+          <p:style>
+            <a:lnRef idx="1">
+              <a:schemeClr val="accent1"/>
+            </a:lnRef>
+            <a:fillRef idx="0">
+              <a:schemeClr val="accent1"/>
+            </a:fillRef>
+            <a:effectRef idx="0">
+              <a:schemeClr val="accent1"/>
+            </a:effectRef>
+            <a:fontRef idx="minor">
+              <a:schemeClr val="tx1"/>
+            </a:fontRef>
+          </p:style>
+        </p:cxnSp>
+      </p:grpSp>
+    </p:spTree>
+    <p:extLst>
+      <p:ext uri="{BB962C8B-B14F-4D97-AF65-F5344CB8AC3E}">
+        <p14:creationId xmlns:p14="http://schemas.microsoft.com/office/powerpoint/2010/main" val="3173386995"/>
       </p:ext>
     </p:extLst>
   </p:cSld>

</xml_diff>